<commit_message>
Updating presentation with details
</commit_message>
<xml_diff>
--- a/proposal/Smart Security System_presentation.pptx
+++ b/proposal/Smart Security System_presentation.pptx
@@ -6,10 +6,11 @@
   </p:sldMasterIdLst>
   <p:sldIdLst>
     <p:sldId id="256" r:id="rId2"/>
-    <p:sldId id="257" r:id="rId3"/>
-    <p:sldId id="258" r:id="rId4"/>
-    <p:sldId id="259" r:id="rId5"/>
-    <p:sldId id="260" r:id="rId6"/>
+    <p:sldId id="261" r:id="rId3"/>
+    <p:sldId id="257" r:id="rId4"/>
+    <p:sldId id="258" r:id="rId5"/>
+    <p:sldId id="259" r:id="rId6"/>
+    <p:sldId id="260" r:id="rId7"/>
   </p:sldIdLst>
   <p:sldSz cx="12192000" cy="6858000"/>
   <p:notesSz cx="6858000" cy="9144000"/>
@@ -108,6 +109,11 @@
       </a:defRPr>
     </a:lvl9pPr>
   </p:defaultTextStyle>
+  <p:extLst>
+    <p:ext uri="{EFAFB233-063F-42B5-8137-9DF3F51BA10A}">
+      <p15:sldGuideLst xmlns:p15="http://schemas.microsoft.com/office/powerpoint/2012/main"/>
+    </p:ext>
+  </p:extLst>
 </p:presentation>
 </file>
 
@@ -161,7 +167,7 @@
           <a:noFill/>
           <a:extLst>
             <a:ext uri="{909E8E84-426E-40dd-AFC4-6F175D3DCCD1}">
-              <a14:hiddenFill xmlns:a14="http://schemas.microsoft.com/office/drawing/2010/main" xmlns="">
+              <a14:hiddenFill xmlns="" xmlns:a14="http://schemas.microsoft.com/office/drawing/2010/main">
                 <a:solidFill>
                   <a:srgbClr val="FFFFFF"/>
                 </a:solidFill>
@@ -221,7 +227,7 @@
             </a:ln>
             <a:extLst>
               <a:ext uri="{91240B29-F687-4f45-9708-019B960494DF}">
-                <a14:hiddenLine xmlns:a14="http://schemas.microsoft.com/office/drawing/2010/main" xmlns="" w="9525">
+                <a14:hiddenLine xmlns="" xmlns:a14="http://schemas.microsoft.com/office/drawing/2010/main" w="9525">
                   <a:solidFill>
                     <a:srgbClr val="000000"/>
                   </a:solidFill>
@@ -311,7 +317,7 @@
             </a:ln>
             <a:extLst>
               <a:ext uri="{91240B29-F687-4f45-9708-019B960494DF}">
-                <a14:hiddenLine xmlns:a14="http://schemas.microsoft.com/office/drawing/2010/main" xmlns="" w="9525">
+                <a14:hiddenLine xmlns="" xmlns:a14="http://schemas.microsoft.com/office/drawing/2010/main" w="9525">
                   <a:solidFill>
                     <a:srgbClr val="000000"/>
                   </a:solidFill>
@@ -401,7 +407,7 @@
             </a:ln>
             <a:extLst>
               <a:ext uri="{91240B29-F687-4f45-9708-019B960494DF}">
-                <a14:hiddenLine xmlns:a14="http://schemas.microsoft.com/office/drawing/2010/main" xmlns="" w="9525">
+                <a14:hiddenLine xmlns="" xmlns:a14="http://schemas.microsoft.com/office/drawing/2010/main" w="9525">
                   <a:solidFill>
                     <a:srgbClr val="000000"/>
                   </a:solidFill>
@@ -435,7 +441,7 @@
             </a:ln>
             <a:extLst>
               <a:ext uri="{91240B29-F687-4f45-9708-019B960494DF}">
-                <a14:hiddenLine xmlns:a14="http://schemas.microsoft.com/office/drawing/2010/main" xmlns="" w="9525">
+                <a14:hiddenLine xmlns="" xmlns:a14="http://schemas.microsoft.com/office/drawing/2010/main" w="9525">
                   <a:solidFill>
                     <a:srgbClr val="000000"/>
                   </a:solidFill>
@@ -525,7 +531,7 @@
             </a:ln>
             <a:extLst>
               <a:ext uri="{91240B29-F687-4f45-9708-019B960494DF}">
-                <a14:hiddenLine xmlns:a14="http://schemas.microsoft.com/office/drawing/2010/main" xmlns="" w="9525">
+                <a14:hiddenLine xmlns="" xmlns:a14="http://schemas.microsoft.com/office/drawing/2010/main" w="9525">
                   <a:solidFill>
                     <a:srgbClr val="000000"/>
                   </a:solidFill>
@@ -587,7 +593,7 @@
             </a:ln>
             <a:extLst>
               <a:ext uri="{91240B29-F687-4f45-9708-019B960494DF}">
-                <a14:hiddenLine xmlns:a14="http://schemas.microsoft.com/office/drawing/2010/main" xmlns="" w="9525">
+                <a14:hiddenLine xmlns="" xmlns:a14="http://schemas.microsoft.com/office/drawing/2010/main" w="9525">
                   <a:solidFill>
                     <a:srgbClr val="000000"/>
                   </a:solidFill>
@@ -649,7 +655,7 @@
             </a:ln>
             <a:extLst>
               <a:ext uri="{91240B29-F687-4f45-9708-019B960494DF}">
-                <a14:hiddenLine xmlns:a14="http://schemas.microsoft.com/office/drawing/2010/main" xmlns="" w="9525">
+                <a14:hiddenLine xmlns="" xmlns:a14="http://schemas.microsoft.com/office/drawing/2010/main" w="9525">
                   <a:solidFill>
                     <a:srgbClr val="000000"/>
                   </a:solidFill>
@@ -739,7 +745,7 @@
             </a:ln>
             <a:extLst>
               <a:ext uri="{91240B29-F687-4f45-9708-019B960494DF}">
-                <a14:hiddenLine xmlns:a14="http://schemas.microsoft.com/office/drawing/2010/main" xmlns="" w="9525">
+                <a14:hiddenLine xmlns="" xmlns:a14="http://schemas.microsoft.com/office/drawing/2010/main" w="9525">
                   <a:solidFill>
                     <a:srgbClr val="000000"/>
                   </a:solidFill>
@@ -801,7 +807,7 @@
             </a:ln>
             <a:extLst>
               <a:ext uri="{91240B29-F687-4f45-9708-019B960494DF}">
-                <a14:hiddenLine xmlns:a14="http://schemas.microsoft.com/office/drawing/2010/main" xmlns="" w="9525">
+                <a14:hiddenLine xmlns="" xmlns:a14="http://schemas.microsoft.com/office/drawing/2010/main" w="9525">
                   <a:solidFill>
                     <a:srgbClr val="000000"/>
                   </a:solidFill>
@@ -863,7 +869,7 @@
             </a:ln>
             <a:extLst>
               <a:ext uri="{91240B29-F687-4f45-9708-019B960494DF}">
-                <a14:hiddenLine xmlns:a14="http://schemas.microsoft.com/office/drawing/2010/main" xmlns="" w="9525">
+                <a14:hiddenLine xmlns="" xmlns:a14="http://schemas.microsoft.com/office/drawing/2010/main" w="9525">
                   <a:solidFill>
                     <a:srgbClr val="000000"/>
                   </a:solidFill>
@@ -953,7 +959,7 @@
             </a:ln>
             <a:extLst>
               <a:ext uri="{91240B29-F687-4f45-9708-019B960494DF}">
-                <a14:hiddenLine xmlns:a14="http://schemas.microsoft.com/office/drawing/2010/main" xmlns="" w="9525">
+                <a14:hiddenLine xmlns="" xmlns:a14="http://schemas.microsoft.com/office/drawing/2010/main" w="9525">
                   <a:solidFill>
                     <a:srgbClr val="000000"/>
                   </a:solidFill>
@@ -1043,7 +1049,7 @@
             </a:ln>
             <a:extLst>
               <a:ext uri="{91240B29-F687-4f45-9708-019B960494DF}">
-                <a14:hiddenLine xmlns:a14="http://schemas.microsoft.com/office/drawing/2010/main" xmlns="" w="9525">
+                <a14:hiddenLine xmlns="" xmlns:a14="http://schemas.microsoft.com/office/drawing/2010/main" w="9525">
                   <a:solidFill>
                     <a:srgbClr val="000000"/>
                   </a:solidFill>
@@ -1105,7 +1111,7 @@
             </a:ln>
             <a:extLst>
               <a:ext uri="{91240B29-F687-4f45-9708-019B960494DF}">
-                <a14:hiddenLine xmlns:a14="http://schemas.microsoft.com/office/drawing/2010/main" xmlns="" w="9525">
+                <a14:hiddenLine xmlns="" xmlns:a14="http://schemas.microsoft.com/office/drawing/2010/main" w="9525">
                   <a:solidFill>
                     <a:srgbClr val="000000"/>
                   </a:solidFill>
@@ -1215,7 +1221,7 @@
             </a:ln>
             <a:extLst>
               <a:ext uri="{91240B29-F687-4f45-9708-019B960494DF}">
-                <a14:hiddenLine xmlns:a14="http://schemas.microsoft.com/office/drawing/2010/main" xmlns="" w="9525">
+                <a14:hiddenLine xmlns="" xmlns:a14="http://schemas.microsoft.com/office/drawing/2010/main" w="9525">
                   <a:solidFill>
                     <a:srgbClr val="000000"/>
                   </a:solidFill>
@@ -1277,7 +1283,7 @@
             </a:ln>
             <a:extLst>
               <a:ext uri="{91240B29-F687-4f45-9708-019B960494DF}">
-                <a14:hiddenLine xmlns:a14="http://schemas.microsoft.com/office/drawing/2010/main" xmlns="" w="9525">
+                <a14:hiddenLine xmlns="" xmlns:a14="http://schemas.microsoft.com/office/drawing/2010/main" w="9525">
                   <a:solidFill>
                     <a:srgbClr val="000000"/>
                   </a:solidFill>
@@ -1367,7 +1373,7 @@
             </a:ln>
             <a:extLst>
               <a:ext uri="{91240B29-F687-4f45-9708-019B960494DF}">
-                <a14:hiddenLine xmlns:a14="http://schemas.microsoft.com/office/drawing/2010/main" xmlns="" w="9525">
+                <a14:hiddenLine xmlns="" xmlns:a14="http://schemas.microsoft.com/office/drawing/2010/main" w="9525">
                   <a:solidFill>
                     <a:srgbClr val="000000"/>
                   </a:solidFill>
@@ -1457,7 +1463,7 @@
             </a:ln>
             <a:extLst>
               <a:ext uri="{91240B29-F687-4f45-9708-019B960494DF}">
-                <a14:hiddenLine xmlns:a14="http://schemas.microsoft.com/office/drawing/2010/main" xmlns="" w="9525">
+                <a14:hiddenLine xmlns="" xmlns:a14="http://schemas.microsoft.com/office/drawing/2010/main" w="9525">
                   <a:solidFill>
                     <a:srgbClr val="000000"/>
                   </a:solidFill>
@@ -1519,7 +1525,7 @@
             </a:ln>
             <a:extLst>
               <a:ext uri="{91240B29-F687-4f45-9708-019B960494DF}">
-                <a14:hiddenLine xmlns:a14="http://schemas.microsoft.com/office/drawing/2010/main" xmlns="" w="9525">
+                <a14:hiddenLine xmlns="" xmlns:a14="http://schemas.microsoft.com/office/drawing/2010/main" w="9525">
                   <a:solidFill>
                     <a:srgbClr val="000000"/>
                   </a:solidFill>
@@ -1609,7 +1615,7 @@
             </a:ln>
             <a:extLst>
               <a:ext uri="{91240B29-F687-4f45-9708-019B960494DF}">
-                <a14:hiddenLine xmlns:a14="http://schemas.microsoft.com/office/drawing/2010/main" xmlns="" w="9525">
+                <a14:hiddenLine xmlns="" xmlns:a14="http://schemas.microsoft.com/office/drawing/2010/main" w="9525">
                   <a:solidFill>
                     <a:srgbClr val="000000"/>
                   </a:solidFill>
@@ -1699,7 +1705,7 @@
             </a:ln>
             <a:extLst>
               <a:ext uri="{91240B29-F687-4f45-9708-019B960494DF}">
-                <a14:hiddenLine xmlns:a14="http://schemas.microsoft.com/office/drawing/2010/main" xmlns="" w="9525">
+                <a14:hiddenLine xmlns="" xmlns:a14="http://schemas.microsoft.com/office/drawing/2010/main" w="9525">
                   <a:solidFill>
                     <a:srgbClr val="000000"/>
                   </a:solidFill>
@@ -1755,7 +1761,7 @@
             </a:ln>
             <a:extLst>
               <a:ext uri="{91240B29-F687-4f45-9708-019B960494DF}">
-                <a14:hiddenLine xmlns:a14="http://schemas.microsoft.com/office/drawing/2010/main" xmlns="" w="9525">
+                <a14:hiddenLine xmlns="" xmlns:a14="http://schemas.microsoft.com/office/drawing/2010/main" w="9525">
                   <a:solidFill>
                     <a:srgbClr val="000000"/>
                   </a:solidFill>
@@ -1845,7 +1851,7 @@
             </a:ln>
             <a:extLst>
               <a:ext uri="{91240B29-F687-4f45-9708-019B960494DF}">
-                <a14:hiddenLine xmlns:a14="http://schemas.microsoft.com/office/drawing/2010/main" xmlns="" w="9525">
+                <a14:hiddenLine xmlns="" xmlns:a14="http://schemas.microsoft.com/office/drawing/2010/main" w="9525">
                   <a:solidFill>
                     <a:srgbClr val="000000"/>
                   </a:solidFill>
@@ -1901,7 +1907,7 @@
             </a:ln>
             <a:extLst>
               <a:ext uri="{91240B29-F687-4f45-9708-019B960494DF}">
-                <a14:hiddenLine xmlns:a14="http://schemas.microsoft.com/office/drawing/2010/main" xmlns="" w="9525">
+                <a14:hiddenLine xmlns="" xmlns:a14="http://schemas.microsoft.com/office/drawing/2010/main" w="9525">
                   <a:solidFill>
                     <a:srgbClr val="000000"/>
                   </a:solidFill>
@@ -1991,7 +1997,7 @@
             </a:ln>
             <a:extLst>
               <a:ext uri="{91240B29-F687-4f45-9708-019B960494DF}">
-                <a14:hiddenLine xmlns:a14="http://schemas.microsoft.com/office/drawing/2010/main" xmlns="" w="9525">
+                <a14:hiddenLine xmlns="" xmlns:a14="http://schemas.microsoft.com/office/drawing/2010/main" w="9525">
                   <a:solidFill>
                     <a:srgbClr val="000000"/>
                   </a:solidFill>
@@ -2059,7 +2065,7 @@
             </a:ln>
             <a:extLst>
               <a:ext uri="{91240B29-F687-4f45-9708-019B960494DF}">
-                <a14:hiddenLine xmlns:a14="http://schemas.microsoft.com/office/drawing/2010/main" xmlns="" w="9525">
+                <a14:hiddenLine xmlns="" xmlns:a14="http://schemas.microsoft.com/office/drawing/2010/main" w="9525">
                   <a:solidFill>
                     <a:srgbClr val="000000"/>
                   </a:solidFill>
@@ -2149,7 +2155,7 @@
             </a:ln>
             <a:extLst>
               <a:ext uri="{91240B29-F687-4f45-9708-019B960494DF}">
-                <a14:hiddenLine xmlns:a14="http://schemas.microsoft.com/office/drawing/2010/main" xmlns="" w="9525">
+                <a14:hiddenLine xmlns="" xmlns:a14="http://schemas.microsoft.com/office/drawing/2010/main" w="9525">
                   <a:solidFill>
                     <a:srgbClr val="000000"/>
                   </a:solidFill>
@@ -2217,7 +2223,7 @@
             </a:ln>
             <a:extLst>
               <a:ext uri="{91240B29-F687-4f45-9708-019B960494DF}">
-                <a14:hiddenLine xmlns:a14="http://schemas.microsoft.com/office/drawing/2010/main" xmlns="" w="9525">
+                <a14:hiddenLine xmlns="" xmlns:a14="http://schemas.microsoft.com/office/drawing/2010/main" w="9525">
                   <a:solidFill>
                     <a:srgbClr val="000000"/>
                   </a:solidFill>
@@ -2307,7 +2313,7 @@
             </a:ln>
             <a:extLst>
               <a:ext uri="{91240B29-F687-4f45-9708-019B960494DF}">
-                <a14:hiddenLine xmlns:a14="http://schemas.microsoft.com/office/drawing/2010/main" xmlns="" w="9525">
+                <a14:hiddenLine xmlns="" xmlns:a14="http://schemas.microsoft.com/office/drawing/2010/main" w="9525">
                   <a:solidFill>
                     <a:srgbClr val="000000"/>
                   </a:solidFill>
@@ -2341,7 +2347,7 @@
             </a:ln>
             <a:extLst>
               <a:ext uri="{91240B29-F687-4f45-9708-019B960494DF}">
-                <a14:hiddenLine xmlns:a14="http://schemas.microsoft.com/office/drawing/2010/main" xmlns="" w="9525">
+                <a14:hiddenLine xmlns="" xmlns:a14="http://schemas.microsoft.com/office/drawing/2010/main" w="9525">
                   <a:solidFill>
                     <a:srgbClr val="000000"/>
                   </a:solidFill>
@@ -2431,7 +2437,7 @@
             </a:ln>
             <a:extLst>
               <a:ext uri="{91240B29-F687-4f45-9708-019B960494DF}">
-                <a14:hiddenLine xmlns:a14="http://schemas.microsoft.com/office/drawing/2010/main" xmlns="" w="9525">
+                <a14:hiddenLine xmlns="" xmlns:a14="http://schemas.microsoft.com/office/drawing/2010/main" w="9525">
                   <a:solidFill>
                     <a:srgbClr val="000000"/>
                   </a:solidFill>
@@ -2493,7 +2499,7 @@
             </a:ln>
             <a:extLst>
               <a:ext uri="{91240B29-F687-4f45-9708-019B960494DF}">
-                <a14:hiddenLine xmlns:a14="http://schemas.microsoft.com/office/drawing/2010/main" xmlns="" w="9525">
+                <a14:hiddenLine xmlns="" xmlns:a14="http://schemas.microsoft.com/office/drawing/2010/main" w="9525">
                   <a:solidFill>
                     <a:srgbClr val="000000"/>
                   </a:solidFill>
@@ -2555,7 +2561,7 @@
             </a:ln>
             <a:extLst>
               <a:ext uri="{91240B29-F687-4f45-9708-019B960494DF}">
-                <a14:hiddenLine xmlns:a14="http://schemas.microsoft.com/office/drawing/2010/main" xmlns="" w="9525">
+                <a14:hiddenLine xmlns="" xmlns:a14="http://schemas.microsoft.com/office/drawing/2010/main" w="9525">
                   <a:solidFill>
                     <a:srgbClr val="000000"/>
                   </a:solidFill>
@@ -2645,7 +2651,7 @@
             </a:ln>
             <a:extLst>
               <a:ext uri="{91240B29-F687-4f45-9708-019B960494DF}">
-                <a14:hiddenLine xmlns:a14="http://schemas.microsoft.com/office/drawing/2010/main" xmlns="" w="9525">
+                <a14:hiddenLine xmlns="" xmlns:a14="http://schemas.microsoft.com/office/drawing/2010/main" w="9525">
                   <a:solidFill>
                     <a:srgbClr val="000000"/>
                   </a:solidFill>
@@ -2713,7 +2719,7 @@
             </a:ln>
             <a:extLst>
               <a:ext uri="{91240B29-F687-4f45-9708-019B960494DF}">
-                <a14:hiddenLine xmlns:a14="http://schemas.microsoft.com/office/drawing/2010/main" xmlns="" w="9525">
+                <a14:hiddenLine xmlns="" xmlns:a14="http://schemas.microsoft.com/office/drawing/2010/main" w="9525">
                   <a:solidFill>
                     <a:srgbClr val="000000"/>
                   </a:solidFill>
@@ -2775,7 +2781,7 @@
             </a:ln>
             <a:extLst>
               <a:ext uri="{91240B29-F687-4f45-9708-019B960494DF}">
-                <a14:hiddenLine xmlns:a14="http://schemas.microsoft.com/office/drawing/2010/main" xmlns="" w="9525">
+                <a14:hiddenLine xmlns="" xmlns:a14="http://schemas.microsoft.com/office/drawing/2010/main" w="9525">
                   <a:solidFill>
                     <a:srgbClr val="000000"/>
                   </a:solidFill>
@@ -2865,7 +2871,7 @@
             </a:ln>
             <a:extLst>
               <a:ext uri="{91240B29-F687-4f45-9708-019B960494DF}">
-                <a14:hiddenLine xmlns:a14="http://schemas.microsoft.com/office/drawing/2010/main" xmlns="" w="9525">
+                <a14:hiddenLine xmlns="" xmlns:a14="http://schemas.microsoft.com/office/drawing/2010/main" w="9525">
                   <a:solidFill>
                     <a:srgbClr val="000000"/>
                   </a:solidFill>
@@ -2927,7 +2933,7 @@
             </a:ln>
             <a:extLst>
               <a:ext uri="{91240B29-F687-4f45-9708-019B960494DF}">
-                <a14:hiddenLine xmlns:a14="http://schemas.microsoft.com/office/drawing/2010/main" xmlns="" w="9525">
+                <a14:hiddenLine xmlns="" xmlns:a14="http://schemas.microsoft.com/office/drawing/2010/main" w="9525">
                   <a:solidFill>
                     <a:srgbClr val="000000"/>
                   </a:solidFill>
@@ -3017,7 +3023,7 @@
             </a:ln>
             <a:extLst>
               <a:ext uri="{91240B29-F687-4f45-9708-019B960494DF}">
-                <a14:hiddenLine xmlns:a14="http://schemas.microsoft.com/office/drawing/2010/main" xmlns="" w="9525">
+                <a14:hiddenLine xmlns="" xmlns:a14="http://schemas.microsoft.com/office/drawing/2010/main" w="9525">
                   <a:solidFill>
                     <a:srgbClr val="000000"/>
                   </a:solidFill>
@@ -3079,7 +3085,7 @@
             </a:ln>
             <a:extLst>
               <a:ext uri="{91240B29-F687-4f45-9708-019B960494DF}">
-                <a14:hiddenLine xmlns:a14="http://schemas.microsoft.com/office/drawing/2010/main" xmlns="" w="9525">
+                <a14:hiddenLine xmlns="" xmlns:a14="http://schemas.microsoft.com/office/drawing/2010/main" w="9525">
                   <a:solidFill>
                     <a:srgbClr val="000000"/>
                   </a:solidFill>
@@ -3169,7 +3175,7 @@
             </a:ln>
             <a:extLst>
               <a:ext uri="{91240B29-F687-4f45-9708-019B960494DF}">
-                <a14:hiddenLine xmlns:a14="http://schemas.microsoft.com/office/drawing/2010/main" xmlns="" w="9525">
+                <a14:hiddenLine xmlns="" xmlns:a14="http://schemas.microsoft.com/office/drawing/2010/main" w="9525">
                   <a:solidFill>
                     <a:srgbClr val="000000"/>
                   </a:solidFill>
@@ -3203,7 +3209,7 @@
             </a:ln>
             <a:extLst>
               <a:ext uri="{91240B29-F687-4f45-9708-019B960494DF}">
-                <a14:hiddenLine xmlns:a14="http://schemas.microsoft.com/office/drawing/2010/main" xmlns="" w="9525">
+                <a14:hiddenLine xmlns="" xmlns:a14="http://schemas.microsoft.com/office/drawing/2010/main" w="9525">
                   <a:solidFill>
                     <a:srgbClr val="000000"/>
                   </a:solidFill>
@@ -3268,7 +3274,7 @@
             </a:ln>
             <a:extLst>
               <a:ext uri="{91240B29-F687-4f45-9708-019B960494DF}">
-                <a14:hiddenLine xmlns:a14="http://schemas.microsoft.com/office/drawing/2010/main" xmlns="" w="9525">
+                <a14:hiddenLine xmlns="" xmlns:a14="http://schemas.microsoft.com/office/drawing/2010/main" w="9525">
                   <a:solidFill>
                     <a:srgbClr val="000000"/>
                   </a:solidFill>
@@ -3358,7 +3364,7 @@
             </a:ln>
             <a:extLst>
               <a:ext uri="{91240B29-F687-4f45-9708-019B960494DF}">
-                <a14:hiddenLine xmlns:a14="http://schemas.microsoft.com/office/drawing/2010/main" xmlns="" w="9525">
+                <a14:hiddenLine xmlns="" xmlns:a14="http://schemas.microsoft.com/office/drawing/2010/main" w="9525">
                   <a:solidFill>
                     <a:srgbClr val="000000"/>
                   </a:solidFill>
@@ -3420,7 +3426,7 @@
             </a:ln>
             <a:extLst>
               <a:ext uri="{91240B29-F687-4f45-9708-019B960494DF}">
-                <a14:hiddenLine xmlns:a14="http://schemas.microsoft.com/office/drawing/2010/main" xmlns="" w="9525">
+                <a14:hiddenLine xmlns="" xmlns:a14="http://schemas.microsoft.com/office/drawing/2010/main" w="9525">
                   <a:solidFill>
                     <a:srgbClr val="000000"/>
                   </a:solidFill>
@@ -3510,7 +3516,7 @@
             </a:ln>
             <a:extLst>
               <a:ext uri="{91240B29-F687-4f45-9708-019B960494DF}">
-                <a14:hiddenLine xmlns:a14="http://schemas.microsoft.com/office/drawing/2010/main" xmlns="" w="9525">
+                <a14:hiddenLine xmlns="" xmlns:a14="http://schemas.microsoft.com/office/drawing/2010/main" w="9525">
                   <a:solidFill>
                     <a:srgbClr val="000000"/>
                   </a:solidFill>
@@ -3600,7 +3606,7 @@
             </a:ln>
             <a:extLst>
               <a:ext uri="{91240B29-F687-4f45-9708-019B960494DF}">
-                <a14:hiddenLine xmlns:a14="http://schemas.microsoft.com/office/drawing/2010/main" xmlns="" w="9525">
+                <a14:hiddenLine xmlns="" xmlns:a14="http://schemas.microsoft.com/office/drawing/2010/main" w="9525">
                   <a:solidFill>
                     <a:srgbClr val="000000"/>
                   </a:solidFill>
@@ -3665,7 +3671,7 @@
             </a:ln>
             <a:extLst>
               <a:ext uri="{91240B29-F687-4f45-9708-019B960494DF}">
-                <a14:hiddenLine xmlns:a14="http://schemas.microsoft.com/office/drawing/2010/main" xmlns="" w="9525">
+                <a14:hiddenLine xmlns="" xmlns:a14="http://schemas.microsoft.com/office/drawing/2010/main" w="9525">
                   <a:solidFill>
                     <a:srgbClr val="000000"/>
                   </a:solidFill>
@@ -3727,7 +3733,7 @@
             </a:ln>
             <a:extLst>
               <a:ext uri="{91240B29-F687-4f45-9708-019B960494DF}">
-                <a14:hiddenLine xmlns:a14="http://schemas.microsoft.com/office/drawing/2010/main" xmlns="" w="9525">
+                <a14:hiddenLine xmlns="" xmlns:a14="http://schemas.microsoft.com/office/drawing/2010/main" w="9525">
                   <a:solidFill>
                     <a:srgbClr val="000000"/>
                   </a:solidFill>
@@ -3817,7 +3823,7 @@
             </a:ln>
             <a:extLst>
               <a:ext uri="{91240B29-F687-4f45-9708-019B960494DF}">
-                <a14:hiddenLine xmlns:a14="http://schemas.microsoft.com/office/drawing/2010/main" xmlns="" w="9525">
+                <a14:hiddenLine xmlns="" xmlns:a14="http://schemas.microsoft.com/office/drawing/2010/main" w="9525">
                   <a:solidFill>
                     <a:srgbClr val="000000"/>
                   </a:solidFill>
@@ -3907,7 +3913,7 @@
             </a:ln>
             <a:extLst>
               <a:ext uri="{91240B29-F687-4f45-9708-019B960494DF}">
-                <a14:hiddenLine xmlns:a14="http://schemas.microsoft.com/office/drawing/2010/main" xmlns="" w="9525">
+                <a14:hiddenLine xmlns="" xmlns:a14="http://schemas.microsoft.com/office/drawing/2010/main" w="9525">
                   <a:solidFill>
                     <a:srgbClr val="000000"/>
                   </a:solidFill>
@@ -3969,7 +3975,7 @@
             </a:ln>
             <a:extLst>
               <a:ext uri="{91240B29-F687-4f45-9708-019B960494DF}">
-                <a14:hiddenLine xmlns:a14="http://schemas.microsoft.com/office/drawing/2010/main" xmlns="" w="9525">
+                <a14:hiddenLine xmlns="" xmlns:a14="http://schemas.microsoft.com/office/drawing/2010/main" w="9525">
                   <a:solidFill>
                     <a:srgbClr val="000000"/>
                   </a:solidFill>
@@ -4089,7 +4095,7 @@
             </a:ln>
             <a:extLst>
               <a:ext uri="{91240B29-F687-4f45-9708-019B960494DF}">
-                <a14:hiddenLine xmlns:a14="http://schemas.microsoft.com/office/drawing/2010/main" xmlns="" w="9525">
+                <a14:hiddenLine xmlns="" xmlns:a14="http://schemas.microsoft.com/office/drawing/2010/main" w="9525">
                   <a:solidFill>
                     <a:srgbClr val="000000"/>
                   </a:solidFill>
@@ -4157,7 +4163,7 @@
             </a:ln>
             <a:extLst>
               <a:ext uri="{91240B29-F687-4f45-9708-019B960494DF}">
-                <a14:hiddenLine xmlns:a14="http://schemas.microsoft.com/office/drawing/2010/main" xmlns="" w="9525">
+                <a14:hiddenLine xmlns="" xmlns:a14="http://schemas.microsoft.com/office/drawing/2010/main" w="9525">
                   <a:solidFill>
                     <a:srgbClr val="000000"/>
                   </a:solidFill>
@@ -4247,7 +4253,7 @@
             </a:ln>
             <a:extLst>
               <a:ext uri="{91240B29-F687-4f45-9708-019B960494DF}">
-                <a14:hiddenLine xmlns:a14="http://schemas.microsoft.com/office/drawing/2010/main" xmlns="" w="9525">
+                <a14:hiddenLine xmlns="" xmlns:a14="http://schemas.microsoft.com/office/drawing/2010/main" w="9525">
                   <a:solidFill>
                     <a:srgbClr val="000000"/>
                   </a:solidFill>
@@ -4387,7 +4393,7 @@
           <a:p>
             <a:fld id="{48A87A34-81AB-432B-8DAE-1953F412C126}" type="datetimeFigureOut">
               <a:rPr lang="en-US" dirty="0"/>
-              <a:t>11/24/2019</a:t>
+              <a:t>11/27/2019</a:t>
             </a:fld>
             <a:endParaRPr lang="en-US" dirty="0"/>
           </a:p>
@@ -4649,7 +4655,7 @@
           <a:p>
             <a:fld id="{48A87A34-81AB-432B-8DAE-1953F412C126}" type="datetimeFigureOut">
               <a:rPr lang="en-US" dirty="0"/>
-              <a:t>11/24/2019</a:t>
+              <a:t>11/27/2019</a:t>
             </a:fld>
             <a:endParaRPr lang="en-US" dirty="0"/>
           </a:p>
@@ -4840,7 +4846,7 @@
           <a:p>
             <a:fld id="{48A87A34-81AB-432B-8DAE-1953F412C126}" type="datetimeFigureOut">
               <a:rPr lang="en-US" dirty="0"/>
-              <a:t>11/24/2019</a:t>
+              <a:t>11/27/2019</a:t>
             </a:fld>
             <a:endParaRPr lang="en-US" dirty="0"/>
           </a:p>
@@ -5098,7 +5104,7 @@
           <a:p>
             <a:fld id="{48A87A34-81AB-432B-8DAE-1953F412C126}" type="datetimeFigureOut">
               <a:rPr lang="en-US" dirty="0"/>
-              <a:t>11/24/2019</a:t>
+              <a:t>11/27/2019</a:t>
             </a:fld>
             <a:endParaRPr lang="en-US" dirty="0"/>
           </a:p>
@@ -5527,7 +5533,7 @@
           <a:p>
             <a:fld id="{48A87A34-81AB-432B-8DAE-1953F412C126}" type="datetimeFigureOut">
               <a:rPr lang="en-US" dirty="0"/>
-              <a:t>11/24/2019</a:t>
+              <a:t>11/27/2019</a:t>
             </a:fld>
             <a:endParaRPr lang="en-US" dirty="0"/>
           </a:p>
@@ -6068,7 +6074,7 @@
           <a:p>
             <a:fld id="{48A87A34-81AB-432B-8DAE-1953F412C126}" type="datetimeFigureOut">
               <a:rPr lang="en-US" dirty="0"/>
-              <a:t>11/24/2019</a:t>
+              <a:t>11/27/2019</a:t>
             </a:fld>
             <a:endParaRPr lang="en-US" dirty="0"/>
           </a:p>
@@ -6783,7 +6789,7 @@
           <a:p>
             <a:fld id="{48A87A34-81AB-432B-8DAE-1953F412C126}" type="datetimeFigureOut">
               <a:rPr lang="en-US" dirty="0"/>
-              <a:t>11/24/2019</a:t>
+              <a:t>11/27/2019</a:t>
             </a:fld>
             <a:endParaRPr lang="en-US" dirty="0"/>
           </a:p>
@@ -6948,7 +6954,7 @@
           <a:p>
             <a:fld id="{48A87A34-81AB-432B-8DAE-1953F412C126}" type="datetimeFigureOut">
               <a:rPr lang="en-US" dirty="0"/>
-              <a:t>11/24/2019</a:t>
+              <a:t>11/27/2019</a:t>
             </a:fld>
             <a:endParaRPr lang="en-US" dirty="0"/>
           </a:p>
@@ -7123,7 +7129,7 @@
           <a:p>
             <a:fld id="{48A87A34-81AB-432B-8DAE-1953F412C126}" type="datetimeFigureOut">
               <a:rPr lang="en-US" dirty="0"/>
-              <a:t>11/24/2019</a:t>
+              <a:t>11/27/2019</a:t>
             </a:fld>
             <a:endParaRPr lang="en-US" dirty="0"/>
           </a:p>
@@ -7288,7 +7294,7 @@
           <a:p>
             <a:fld id="{48A87A34-81AB-432B-8DAE-1953F412C126}" type="datetimeFigureOut">
               <a:rPr lang="en-US" dirty="0"/>
-              <a:t>11/24/2019</a:t>
+              <a:t>11/27/2019</a:t>
             </a:fld>
             <a:endParaRPr lang="en-US" dirty="0"/>
           </a:p>
@@ -7533,7 +7539,7 @@
           <a:p>
             <a:fld id="{48A87A34-81AB-432B-8DAE-1953F412C126}" type="datetimeFigureOut">
               <a:rPr lang="en-US" dirty="0"/>
-              <a:t>11/24/2019</a:t>
+              <a:t>11/27/2019</a:t>
             </a:fld>
             <a:endParaRPr lang="en-US" dirty="0"/>
           </a:p>
@@ -7760,7 +7766,7 @@
           <a:p>
             <a:fld id="{48A87A34-81AB-432B-8DAE-1953F412C126}" type="datetimeFigureOut">
               <a:rPr lang="en-US" dirty="0"/>
-              <a:t>11/24/2019</a:t>
+              <a:t>11/27/2019</a:t>
             </a:fld>
             <a:endParaRPr lang="en-US" dirty="0"/>
           </a:p>
@@ -8136,7 +8142,7 @@
           <a:p>
             <a:fld id="{48A87A34-81AB-432B-8DAE-1953F412C126}" type="datetimeFigureOut">
               <a:rPr lang="en-US" dirty="0"/>
-              <a:t>11/24/2019</a:t>
+              <a:t>11/27/2019</a:t>
             </a:fld>
             <a:endParaRPr lang="en-US" dirty="0"/>
           </a:p>
@@ -8249,7 +8255,7 @@
           <a:p>
             <a:fld id="{48A87A34-81AB-432B-8DAE-1953F412C126}" type="datetimeFigureOut">
               <a:rPr lang="en-US" dirty="0"/>
-              <a:t>11/24/2019</a:t>
+              <a:t>11/27/2019</a:t>
             </a:fld>
             <a:endParaRPr lang="en-US" dirty="0"/>
           </a:p>
@@ -8339,7 +8345,7 @@
           <a:p>
             <a:fld id="{48A87A34-81AB-432B-8DAE-1953F412C126}" type="datetimeFigureOut">
               <a:rPr lang="en-US" dirty="0"/>
-              <a:t>11/24/2019</a:t>
+              <a:t>11/27/2019</a:t>
             </a:fld>
             <a:endParaRPr lang="en-US" dirty="0"/>
           </a:p>
@@ -8583,7 +8589,7 @@
           <a:p>
             <a:fld id="{48A87A34-81AB-432B-8DAE-1953F412C126}" type="datetimeFigureOut">
               <a:rPr lang="en-US" dirty="0"/>
-              <a:t>11/24/2019</a:t>
+              <a:t>11/27/2019</a:t>
             </a:fld>
             <a:endParaRPr lang="en-US" dirty="0"/>
           </a:p>
@@ -8858,7 +8864,7 @@
           <a:p>
             <a:fld id="{48A87A34-81AB-432B-8DAE-1953F412C126}" type="datetimeFigureOut">
               <a:rPr lang="en-US" dirty="0"/>
-              <a:t>11/24/2019</a:t>
+              <a:t>11/27/2019</a:t>
             </a:fld>
             <a:endParaRPr lang="en-US" dirty="0"/>
           </a:p>
@@ -8969,7 +8975,7 @@
           <a:noFill/>
           <a:extLst>
             <a:ext uri="{909E8E84-426E-40dd-AFC4-6F175D3DCCD1}">
-              <a14:hiddenFill xmlns:a14="http://schemas.microsoft.com/office/drawing/2010/main" xmlns="">
+              <a14:hiddenFill xmlns="" xmlns:a14="http://schemas.microsoft.com/office/drawing/2010/main">
                 <a:solidFill>
                   <a:srgbClr val="FFFFFF"/>
                 </a:solidFill>
@@ -9043,7 +9049,7 @@
               </a:ln>
               <a:extLst>
                 <a:ext uri="{91240B29-F687-4f45-9708-019B960494DF}">
-                  <a14:hiddenLine xmlns:a14="http://schemas.microsoft.com/office/drawing/2010/main" xmlns="" w="9525">
+                  <a14:hiddenLine xmlns="" xmlns:a14="http://schemas.microsoft.com/office/drawing/2010/main" w="9525">
                     <a:solidFill>
                       <a:srgbClr val="000000"/>
                     </a:solidFill>
@@ -9133,7 +9139,7 @@
               </a:ln>
               <a:extLst>
                 <a:ext uri="{91240B29-F687-4f45-9708-019B960494DF}">
-                  <a14:hiddenLine xmlns:a14="http://schemas.microsoft.com/office/drawing/2010/main" xmlns="" w="9525">
+                  <a14:hiddenLine xmlns="" xmlns:a14="http://schemas.microsoft.com/office/drawing/2010/main" w="9525">
                     <a:solidFill>
                       <a:srgbClr val="000000"/>
                     </a:solidFill>
@@ -9223,7 +9229,7 @@
               </a:ln>
               <a:extLst>
                 <a:ext uri="{91240B29-F687-4f45-9708-019B960494DF}">
-                  <a14:hiddenLine xmlns:a14="http://schemas.microsoft.com/office/drawing/2010/main" xmlns="" w="9525">
+                  <a14:hiddenLine xmlns="" xmlns:a14="http://schemas.microsoft.com/office/drawing/2010/main" w="9525">
                     <a:solidFill>
                       <a:srgbClr val="000000"/>
                     </a:solidFill>
@@ -9285,7 +9291,7 @@
               </a:ln>
               <a:extLst>
                 <a:ext uri="{91240B29-F687-4f45-9708-019B960494DF}">
-                  <a14:hiddenLine xmlns:a14="http://schemas.microsoft.com/office/drawing/2010/main" xmlns="" w="9525">
+                  <a14:hiddenLine xmlns="" xmlns:a14="http://schemas.microsoft.com/office/drawing/2010/main" w="9525">
                     <a:solidFill>
                       <a:srgbClr val="000000"/>
                     </a:solidFill>
@@ -9375,7 +9381,7 @@
               </a:ln>
               <a:extLst>
                 <a:ext uri="{91240B29-F687-4f45-9708-019B960494DF}">
-                  <a14:hiddenLine xmlns:a14="http://schemas.microsoft.com/office/drawing/2010/main" xmlns="" w="9525">
+                  <a14:hiddenLine xmlns="" xmlns:a14="http://schemas.microsoft.com/office/drawing/2010/main" w="9525">
                     <a:solidFill>
                       <a:srgbClr val="000000"/>
                     </a:solidFill>
@@ -9437,7 +9443,7 @@
               </a:ln>
               <a:extLst>
                 <a:ext uri="{91240B29-F687-4f45-9708-019B960494DF}">
-                  <a14:hiddenLine xmlns:a14="http://schemas.microsoft.com/office/drawing/2010/main" xmlns="" w="9525">
+                  <a14:hiddenLine xmlns="" xmlns:a14="http://schemas.microsoft.com/office/drawing/2010/main" w="9525">
                     <a:solidFill>
                       <a:srgbClr val="000000"/>
                     </a:solidFill>
@@ -9499,7 +9505,7 @@
               </a:ln>
               <a:extLst>
                 <a:ext uri="{91240B29-F687-4f45-9708-019B960494DF}">
-                  <a14:hiddenLine xmlns:a14="http://schemas.microsoft.com/office/drawing/2010/main" xmlns="" w="9525">
+                  <a14:hiddenLine xmlns="" xmlns:a14="http://schemas.microsoft.com/office/drawing/2010/main" w="9525">
                     <a:solidFill>
                       <a:srgbClr val="000000"/>
                     </a:solidFill>
@@ -9589,7 +9595,7 @@
               </a:ln>
               <a:extLst>
                 <a:ext uri="{91240B29-F687-4f45-9708-019B960494DF}">
-                  <a14:hiddenLine xmlns:a14="http://schemas.microsoft.com/office/drawing/2010/main" xmlns="" w="9525">
+                  <a14:hiddenLine xmlns="" xmlns:a14="http://schemas.microsoft.com/office/drawing/2010/main" w="9525">
                     <a:solidFill>
                       <a:srgbClr val="000000"/>
                     </a:solidFill>
@@ -9679,7 +9685,7 @@
               </a:ln>
               <a:extLst>
                 <a:ext uri="{91240B29-F687-4f45-9708-019B960494DF}">
-                  <a14:hiddenLine xmlns:a14="http://schemas.microsoft.com/office/drawing/2010/main" xmlns="" w="9525">
+                  <a14:hiddenLine xmlns="" xmlns:a14="http://schemas.microsoft.com/office/drawing/2010/main" w="9525">
                     <a:solidFill>
                       <a:srgbClr val="000000"/>
                     </a:solidFill>
@@ -9741,7 +9747,7 @@
               </a:ln>
               <a:extLst>
                 <a:ext uri="{91240B29-F687-4f45-9708-019B960494DF}">
-                  <a14:hiddenLine xmlns:a14="http://schemas.microsoft.com/office/drawing/2010/main" xmlns="" w="9525">
+                  <a14:hiddenLine xmlns="" xmlns:a14="http://schemas.microsoft.com/office/drawing/2010/main" w="9525">
                     <a:solidFill>
                       <a:srgbClr val="000000"/>
                     </a:solidFill>
@@ -9851,7 +9857,7 @@
               </a:ln>
               <a:extLst>
                 <a:ext uri="{91240B29-F687-4f45-9708-019B960494DF}">
-                  <a14:hiddenLine xmlns:a14="http://schemas.microsoft.com/office/drawing/2010/main" xmlns="" w="9525">
+                  <a14:hiddenLine xmlns="" xmlns:a14="http://schemas.microsoft.com/office/drawing/2010/main" w="9525">
                     <a:solidFill>
                       <a:srgbClr val="000000"/>
                     </a:solidFill>
@@ -9935,7 +9941,7 @@
               </a:ln>
               <a:extLst>
                 <a:ext uri="{91240B29-F687-4f45-9708-019B960494DF}">
-                  <a14:hiddenLine xmlns:a14="http://schemas.microsoft.com/office/drawing/2010/main" xmlns="" w="9525">
+                  <a14:hiddenLine xmlns="" xmlns:a14="http://schemas.microsoft.com/office/drawing/2010/main" w="9525">
                     <a:solidFill>
                       <a:srgbClr val="000000"/>
                     </a:solidFill>
@@ -9997,7 +10003,7 @@
               </a:ln>
               <a:extLst>
                 <a:ext uri="{91240B29-F687-4f45-9708-019B960494DF}">
-                  <a14:hiddenLine xmlns:a14="http://schemas.microsoft.com/office/drawing/2010/main" xmlns="" w="9525">
+                  <a14:hiddenLine xmlns="" xmlns:a14="http://schemas.microsoft.com/office/drawing/2010/main" w="9525">
                     <a:solidFill>
                       <a:srgbClr val="000000"/>
                     </a:solidFill>
@@ -10059,7 +10065,7 @@
               </a:ln>
               <a:extLst>
                 <a:ext uri="{91240B29-F687-4f45-9708-019B960494DF}">
-                  <a14:hiddenLine xmlns:a14="http://schemas.microsoft.com/office/drawing/2010/main" xmlns="" w="9525">
+                  <a14:hiddenLine xmlns="" xmlns:a14="http://schemas.microsoft.com/office/drawing/2010/main" w="9525">
                     <a:solidFill>
                       <a:srgbClr val="000000"/>
                     </a:solidFill>
@@ -10149,7 +10155,7 @@
               </a:ln>
               <a:extLst>
                 <a:ext uri="{91240B29-F687-4f45-9708-019B960494DF}">
-                  <a14:hiddenLine xmlns:a14="http://schemas.microsoft.com/office/drawing/2010/main" xmlns="" w="9525">
+                  <a14:hiddenLine xmlns="" xmlns:a14="http://schemas.microsoft.com/office/drawing/2010/main" w="9525">
                     <a:solidFill>
                       <a:srgbClr val="000000"/>
                     </a:solidFill>
@@ -10183,7 +10189,7 @@
               </a:ln>
               <a:extLst>
                 <a:ext uri="{91240B29-F687-4f45-9708-019B960494DF}">
-                  <a14:hiddenLine xmlns:a14="http://schemas.microsoft.com/office/drawing/2010/main" xmlns="" w="9525">
+                  <a14:hiddenLine xmlns="" xmlns:a14="http://schemas.microsoft.com/office/drawing/2010/main" w="9525">
                     <a:solidFill>
                       <a:srgbClr val="000000"/>
                     </a:solidFill>
@@ -10248,7 +10254,7 @@
               </a:ln>
               <a:extLst>
                 <a:ext uri="{91240B29-F687-4f45-9708-019B960494DF}">
-                  <a14:hiddenLine xmlns:a14="http://schemas.microsoft.com/office/drawing/2010/main" xmlns="" w="9525">
+                  <a14:hiddenLine xmlns="" xmlns:a14="http://schemas.microsoft.com/office/drawing/2010/main" w="9525">
                     <a:solidFill>
                       <a:srgbClr val="000000"/>
                     </a:solidFill>
@@ -10338,7 +10344,7 @@
               </a:ln>
               <a:extLst>
                 <a:ext uri="{91240B29-F687-4f45-9708-019B960494DF}">
-                  <a14:hiddenLine xmlns:a14="http://schemas.microsoft.com/office/drawing/2010/main" xmlns="" w="9525">
+                  <a14:hiddenLine xmlns="" xmlns:a14="http://schemas.microsoft.com/office/drawing/2010/main" w="9525">
                     <a:solidFill>
                       <a:srgbClr val="000000"/>
                     </a:solidFill>
@@ -10400,7 +10406,7 @@
               </a:ln>
               <a:extLst>
                 <a:ext uri="{91240B29-F687-4f45-9708-019B960494DF}">
-                  <a14:hiddenLine xmlns:a14="http://schemas.microsoft.com/office/drawing/2010/main" xmlns="" w="9525">
+                  <a14:hiddenLine xmlns="" xmlns:a14="http://schemas.microsoft.com/office/drawing/2010/main" w="9525">
                     <a:solidFill>
                       <a:srgbClr val="000000"/>
                     </a:solidFill>
@@ -10490,7 +10496,7 @@
               </a:ln>
               <a:extLst>
                 <a:ext uri="{91240B29-F687-4f45-9708-019B960494DF}">
-                  <a14:hiddenLine xmlns:a14="http://schemas.microsoft.com/office/drawing/2010/main" xmlns="" w="9525">
+                  <a14:hiddenLine xmlns="" xmlns:a14="http://schemas.microsoft.com/office/drawing/2010/main" w="9525">
                     <a:solidFill>
                       <a:srgbClr val="000000"/>
                     </a:solidFill>
@@ -10555,7 +10561,7 @@
               </a:ln>
               <a:extLst>
                 <a:ext uri="{91240B29-F687-4f45-9708-019B960494DF}">
-                  <a14:hiddenLine xmlns:a14="http://schemas.microsoft.com/office/drawing/2010/main" xmlns="" w="9525">
+                  <a14:hiddenLine xmlns="" xmlns:a14="http://schemas.microsoft.com/office/drawing/2010/main" w="9525">
                     <a:solidFill>
                       <a:srgbClr val="000000"/>
                     </a:solidFill>
@@ -10617,7 +10623,7 @@
               </a:ln>
               <a:extLst>
                 <a:ext uri="{91240B29-F687-4f45-9708-019B960494DF}">
-                  <a14:hiddenLine xmlns:a14="http://schemas.microsoft.com/office/drawing/2010/main" xmlns="" w="9525">
+                  <a14:hiddenLine xmlns="" xmlns:a14="http://schemas.microsoft.com/office/drawing/2010/main" w="9525">
                     <a:solidFill>
                       <a:srgbClr val="000000"/>
                     </a:solidFill>
@@ -10707,7 +10713,7 @@
               </a:ln>
               <a:extLst>
                 <a:ext uri="{91240B29-F687-4f45-9708-019B960494DF}">
-                  <a14:hiddenLine xmlns:a14="http://schemas.microsoft.com/office/drawing/2010/main" xmlns="" w="9525">
+                  <a14:hiddenLine xmlns="" xmlns:a14="http://schemas.microsoft.com/office/drawing/2010/main" w="9525">
                     <a:solidFill>
                       <a:srgbClr val="000000"/>
                     </a:solidFill>
@@ -10797,7 +10803,7 @@
               </a:ln>
               <a:extLst>
                 <a:ext uri="{91240B29-F687-4f45-9708-019B960494DF}">
-                  <a14:hiddenLine xmlns:a14="http://schemas.microsoft.com/office/drawing/2010/main" xmlns="" w="9525">
+                  <a14:hiddenLine xmlns="" xmlns:a14="http://schemas.microsoft.com/office/drawing/2010/main" w="9525">
                     <a:solidFill>
                       <a:srgbClr val="000000"/>
                     </a:solidFill>
@@ -10862,7 +10868,7 @@
               </a:ln>
               <a:extLst>
                 <a:ext uri="{91240B29-F687-4f45-9708-019B960494DF}">
-                  <a14:hiddenLine xmlns:a14="http://schemas.microsoft.com/office/drawing/2010/main" xmlns="" w="9525">
+                  <a14:hiddenLine xmlns="" xmlns:a14="http://schemas.microsoft.com/office/drawing/2010/main" w="9525">
                     <a:solidFill>
                       <a:srgbClr val="000000"/>
                     </a:solidFill>
@@ -10982,7 +10988,7 @@
               </a:ln>
               <a:extLst>
                 <a:ext uri="{91240B29-F687-4f45-9708-019B960494DF}">
-                  <a14:hiddenLine xmlns:a14="http://schemas.microsoft.com/office/drawing/2010/main" xmlns="" w="9525">
+                  <a14:hiddenLine xmlns="" xmlns:a14="http://schemas.microsoft.com/office/drawing/2010/main" w="9525">
                     <a:solidFill>
                       <a:srgbClr val="000000"/>
                     </a:solidFill>
@@ -11080,7 +11086,7 @@
               </a:ln>
               <a:extLst>
                 <a:ext uri="{91240B29-F687-4f45-9708-019B960494DF}">
-                  <a14:hiddenLine xmlns:a14="http://schemas.microsoft.com/office/drawing/2010/main" xmlns="" w="9525">
+                  <a14:hiddenLine xmlns="" xmlns:a14="http://schemas.microsoft.com/office/drawing/2010/main" w="9525">
                     <a:solidFill>
                       <a:srgbClr val="000000"/>
                     </a:solidFill>
@@ -11195,7 +11201,7 @@
               </a:ln>
               <a:extLst>
                 <a:ext uri="{91240B29-F687-4f45-9708-019B960494DF}">
-                  <a14:hiddenLine xmlns:a14="http://schemas.microsoft.com/office/drawing/2010/main" xmlns="" w="9525">
+                  <a14:hiddenLine xmlns="" xmlns:a14="http://schemas.microsoft.com/office/drawing/2010/main" w="9525">
                     <a:solidFill>
                       <a:srgbClr val="000000"/>
                     </a:solidFill>
@@ -11285,7 +11291,7 @@
               </a:ln>
               <a:extLst>
                 <a:ext uri="{91240B29-F687-4f45-9708-019B960494DF}">
-                  <a14:hiddenLine xmlns:a14="http://schemas.microsoft.com/office/drawing/2010/main" xmlns="" w="9525">
+                  <a14:hiddenLine xmlns="" xmlns:a14="http://schemas.microsoft.com/office/drawing/2010/main" w="9525">
                     <a:solidFill>
                       <a:srgbClr val="000000"/>
                     </a:solidFill>
@@ -11350,7 +11356,7 @@
               </a:ln>
               <a:extLst>
                 <a:ext uri="{91240B29-F687-4f45-9708-019B960494DF}">
-                  <a14:hiddenLine xmlns:a14="http://schemas.microsoft.com/office/drawing/2010/main" xmlns="" w="9525">
+                  <a14:hiddenLine xmlns="" xmlns:a14="http://schemas.microsoft.com/office/drawing/2010/main" w="9525">
                     <a:solidFill>
                       <a:srgbClr val="000000"/>
                     </a:solidFill>
@@ -11440,7 +11446,7 @@
               </a:ln>
               <a:extLst>
                 <a:ext uri="{91240B29-F687-4f45-9708-019B960494DF}">
-                  <a14:hiddenLine xmlns:a14="http://schemas.microsoft.com/office/drawing/2010/main" xmlns="" w="9525">
+                  <a14:hiddenLine xmlns="" xmlns:a14="http://schemas.microsoft.com/office/drawing/2010/main" w="9525">
                     <a:solidFill>
                       <a:srgbClr val="000000"/>
                     </a:solidFill>
@@ -11508,7 +11514,7 @@
               </a:ln>
               <a:extLst>
                 <a:ext uri="{91240B29-F687-4f45-9708-019B960494DF}">
-                  <a14:hiddenLine xmlns:a14="http://schemas.microsoft.com/office/drawing/2010/main" xmlns="" w="9525">
+                  <a14:hiddenLine xmlns="" xmlns:a14="http://schemas.microsoft.com/office/drawing/2010/main" w="9525">
                     <a:solidFill>
                       <a:srgbClr val="000000"/>
                     </a:solidFill>
@@ -11598,7 +11604,7 @@
               </a:ln>
               <a:extLst>
                 <a:ext uri="{91240B29-F687-4f45-9708-019B960494DF}">
-                  <a14:hiddenLine xmlns:a14="http://schemas.microsoft.com/office/drawing/2010/main" xmlns="" w="9525">
+                  <a14:hiddenLine xmlns="" xmlns:a14="http://schemas.microsoft.com/office/drawing/2010/main" w="9525">
                     <a:solidFill>
                       <a:srgbClr val="000000"/>
                     </a:solidFill>
@@ -11666,7 +11672,7 @@
               </a:ln>
               <a:extLst>
                 <a:ext uri="{91240B29-F687-4f45-9708-019B960494DF}">
-                  <a14:hiddenLine xmlns:a14="http://schemas.microsoft.com/office/drawing/2010/main" xmlns="" w="9525">
+                  <a14:hiddenLine xmlns="" xmlns:a14="http://schemas.microsoft.com/office/drawing/2010/main" w="9525">
                     <a:solidFill>
                       <a:srgbClr val="000000"/>
                     </a:solidFill>
@@ -11756,7 +11762,7 @@
               </a:ln>
               <a:extLst>
                 <a:ext uri="{91240B29-F687-4f45-9708-019B960494DF}">
-                  <a14:hiddenLine xmlns:a14="http://schemas.microsoft.com/office/drawing/2010/main" xmlns="" w="9525">
+                  <a14:hiddenLine xmlns="" xmlns:a14="http://schemas.microsoft.com/office/drawing/2010/main" w="9525">
                     <a:solidFill>
                       <a:srgbClr val="000000"/>
                     </a:solidFill>
@@ -11790,7 +11796,7 @@
               </a:ln>
               <a:extLst>
                 <a:ext uri="{91240B29-F687-4f45-9708-019B960494DF}">
-                  <a14:hiddenLine xmlns:a14="http://schemas.microsoft.com/office/drawing/2010/main" xmlns="" w="9525">
+                  <a14:hiddenLine xmlns="" xmlns:a14="http://schemas.microsoft.com/office/drawing/2010/main" w="9525">
                     <a:solidFill>
                       <a:srgbClr val="000000"/>
                     </a:solidFill>
@@ -11931,7 +11937,7 @@
             <a:fld id="{48A87A34-81AB-432B-8DAE-1953F412C126}" type="datetimeFigureOut">
               <a:rPr lang="en-US" dirty="0"/>
               <a:pPr/>
-              <a:t>11/24/2019</a:t>
+              <a:t>11/27/2019</a:t>
             </a:fld>
             <a:endParaRPr lang="en-US" dirty="0"/>
           </a:p>
@@ -12429,7 +12435,6 @@
               <a:rPr lang="en-US" dirty="0"/>
               <a:t>Peterson</a:t>
             </a:r>
-            <a:endParaRPr lang="en-US" dirty="0"/>
           </a:p>
         </p:txBody>
       </p:sp>
@@ -12480,7 +12485,7 @@
           <a:p>
             <a:r>
               <a:rPr lang="en-US" dirty="0" smtClean="0"/>
-              <a:t>Inputs</a:t>
+              <a:t>General overview</a:t>
             </a:r>
             <a:endParaRPr lang="en-US" dirty="0"/>
           </a:p>
@@ -12498,17 +12503,59 @@
         </p:nvSpPr>
         <p:spPr/>
         <p:txBody>
-          <a:bodyPr/>
+          <a:bodyPr>
+            <a:normAutofit fontScale="92500" lnSpcReduction="10000"/>
+          </a:bodyPr>
           <a:lstStyle/>
           <a:p>
-            <a:endParaRPr lang="en-US"/>
+            <a:r>
+              <a:rPr lang="en-US" dirty="0" smtClean="0"/>
+              <a:t>Basic security detection methods with PIR sensor</a:t>
+            </a:r>
+          </a:p>
+          <a:p>
+            <a:r>
+              <a:rPr lang="en-US" dirty="0" smtClean="0"/>
+              <a:t>Intelligent scheduling linked up to Google Calendar</a:t>
+            </a:r>
+          </a:p>
+          <a:p>
+            <a:r>
+              <a:rPr lang="en-US" dirty="0" smtClean="0"/>
+              <a:t>Arm/Disarm using hardware keypad &amp; web user interface</a:t>
+            </a:r>
+          </a:p>
+          <a:p>
+            <a:r>
+              <a:rPr lang="en-US" dirty="0" smtClean="0"/>
+              <a:t>Notifications</a:t>
+            </a:r>
+          </a:p>
+          <a:p>
+            <a:r>
+              <a:rPr lang="en-US" dirty="0" smtClean="0"/>
+              <a:t>Live stream</a:t>
+            </a:r>
+          </a:p>
+          <a:p>
+            <a:r>
+              <a:rPr lang="en-US" dirty="0" smtClean="0"/>
+              <a:t>Watson Graphs</a:t>
+            </a:r>
+          </a:p>
+          <a:p>
+            <a:r>
+              <a:rPr lang="en-US" dirty="0" smtClean="0"/>
+              <a:t>Automated &amp; remote testing</a:t>
+            </a:r>
+            <a:endParaRPr lang="en-US" dirty="0"/>
           </a:p>
         </p:txBody>
       </p:sp>
     </p:spTree>
     <p:extLst>
       <p:ext uri="{BB962C8B-B14F-4D97-AF65-F5344CB8AC3E}">
-        <p14:creationId xmlns:p14="http://schemas.microsoft.com/office/powerpoint/2010/main" val="3658949672"/>
+        <p14:creationId xmlns:p14="http://schemas.microsoft.com/office/powerpoint/2010/main" val="530037198"/>
       </p:ext>
     </p:extLst>
   </p:cSld>
@@ -12552,7 +12599,7 @@
           <a:p>
             <a:r>
               <a:rPr lang="en-US" dirty="0" smtClean="0"/>
-              <a:t>outputs</a:t>
+              <a:t>Inputs</a:t>
             </a:r>
             <a:endParaRPr lang="en-US" dirty="0"/>
           </a:p>
@@ -12573,14 +12620,243 @@
           <a:bodyPr/>
           <a:lstStyle/>
           <a:p>
-            <a:endParaRPr lang="en-US"/>
+            <a:r>
+              <a:rPr lang="en-US" dirty="0" smtClean="0"/>
+              <a:t>HC-SR501 PIR(passive infrared) Motion Sensor</a:t>
+            </a:r>
+          </a:p>
+          <a:p>
+            <a:r>
+              <a:rPr lang="en-US" dirty="0" smtClean="0"/>
+              <a:t>4x4 Matrix membrane switch</a:t>
+            </a:r>
+          </a:p>
+          <a:p>
+            <a:r>
+              <a:rPr lang="en-US" dirty="0" smtClean="0"/>
+              <a:t>Google Calendar</a:t>
+            </a:r>
+            <a:endParaRPr lang="en-US" dirty="0"/>
           </a:p>
         </p:txBody>
       </p:sp>
+      <p:pic>
+        <p:nvPicPr>
+          <p:cNvPr id="1026" name="Picture 2" descr="Image result for keypad membrane module"/>
+          <p:cNvPicPr>
+            <a:picLocks noChangeAspect="1" noChangeArrowheads="1"/>
+          </p:cNvPicPr>
+          <p:nvPr/>
+        </p:nvPicPr>
+        <p:blipFill>
+          <a:blip r:embed="rId2">
+            <a:extLst>
+              <a:ext uri="{BEBA8EAE-BF5A-486C-A8C5-ECC9F3942E4B}">
+                <a14:imgProps xmlns:a14="http://schemas.microsoft.com/office/drawing/2010/main">
+                  <a14:imgLayer r:embed="rId3">
+                    <a14:imgEffect>
+                      <a14:backgroundRemoval t="6600" b="94200" l="10000" r="90000">
+                        <a14:foregroundMark x1="51300" y1="57200" x2="51300" y2="57200"/>
+                        <a14:foregroundMark x1="67000" y1="54300" x2="67000" y2="54300"/>
+                        <a14:foregroundMark x1="62800" y1="52300" x2="62800" y2="52300"/>
+                        <a14:foregroundMark x1="68700" y1="55100" x2="68700" y2="55100"/>
+                        <a14:foregroundMark x1="67200" y1="56000" x2="67200" y2="56000"/>
+                        <a14:foregroundMark x1="65700" y1="57700" x2="65700" y2="57700"/>
+                        <a14:foregroundMark x1="52700" y1="38600" x2="52700" y2="38600"/>
+                        <a14:foregroundMark x1="51300" y1="44200" x2="51300" y2="44200"/>
+                        <a14:foregroundMark x1="52100" y1="45700" x2="52100" y2="45700"/>
+                        <a14:foregroundMark x1="49900" y1="42700" x2="49900" y2="42700"/>
+                        <a14:foregroundMark x1="47800" y1="39600" x2="47800" y2="39600"/>
+                        <a14:foregroundMark x1="46200" y1="38200" x2="46200" y2="38200"/>
+                        <a14:foregroundMark x1="47200" y1="32400" x2="47200" y2="32400"/>
+                        <a14:foregroundMark x1="45800" y1="30600" x2="45800" y2="30600"/>
+                        <a14:foregroundMark x1="54700" y1="30700" x2="54700" y2="30700"/>
+                        <a14:foregroundMark x1="61500" y1="36000" x2="61500" y2="36000"/>
+                        <a14:foregroundMark x1="53900" y1="45600" x2="53900" y2="45600"/>
+                        <a14:foregroundMark x1="31600" y1="31500" x2="31600" y2="31500"/>
+                        <a14:foregroundMark x1="32600" y1="31500" x2="32600" y2="31500"/>
+                        <a14:foregroundMark x1="32500" y1="34700" x2="32500" y2="34700"/>
+                        <a14:foregroundMark x1="31300" y1="26300" x2="31300" y2="26300"/>
+                        <a14:foregroundMark x1="64500" y1="29700" x2="64500" y2="29700"/>
+                        <a14:foregroundMark x1="56300" y1="6600" x2="56300" y2="6600"/>
+                        <a14:foregroundMark x1="68300" y1="9800" x2="68300" y2="9800"/>
+                        <a14:foregroundMark x1="59400" y1="14900" x2="59400" y2="14900"/>
+                        <a14:foregroundMark x1="31000" y1="7500" x2="31000" y2="7500"/>
+                        <a14:foregroundMark x1="32400" y1="11100" x2="32400" y2="11100"/>
+                        <a14:foregroundMark x1="37500" y1="12200" x2="37500" y2="12200"/>
+                        <a14:foregroundMark x1="44300" y1="13100" x2="44300" y2="13100"/>
+                        <a14:foregroundMark x1="54600" y1="15500" x2="54600" y2="15500"/>
+                        <a14:foregroundMark x1="39900" y1="20900" x2="39900" y2="20900"/>
+                        <a14:foregroundMark x1="43800" y1="20900" x2="43800" y2="20900"/>
+                        <a14:foregroundMark x1="53400" y1="20400" x2="53400" y2="20400"/>
+                        <a14:foregroundMark x1="62400" y1="20300" x2="62400" y2="20300"/>
+                        <a14:foregroundMark x1="32800" y1="8800" x2="33300" y2="44300"/>
+                        <a14:foregroundMark x1="45000" y1="86200" x2="45300" y2="94200"/>
+                        <a14:foregroundMark x1="35700" y1="35100" x2="40800" y2="40200"/>
+                        <a14:backgroundMark x1="65100" y1="56500" x2="65100" y2="56500"/>
+                        <a14:backgroundMark x1="62700" y1="52400" x2="62700" y2="52400"/>
+                        <a14:backgroundMark x1="60400" y1="50000" x2="74700" y2="59500"/>
+                        <a14:backgroundMark x1="70400" y1="55000" x2="70400" y2="55000"/>
+                      </a14:backgroundRemoval>
+                    </a14:imgEffect>
+                  </a14:imgLayer>
+                </a14:imgProps>
+              </a:ext>
+              <a:ext uri="{28A0092B-C50C-407E-A947-70E740481C1C}">
+                <a14:useLocalDpi xmlns:a14="http://schemas.microsoft.com/office/drawing/2010/main" val="0"/>
+              </a:ext>
+            </a:extLst>
+          </a:blip>
+          <a:srcRect/>
+          <a:stretch>
+            <a:fillRect/>
+          </a:stretch>
+        </p:blipFill>
+        <p:spPr bwMode="auto">
+          <a:xfrm>
+            <a:off x="7313151" y="618518"/>
+            <a:ext cx="4953202" cy="4953202"/>
+          </a:xfrm>
+          <a:prstGeom prst="rect">
+            <a:avLst/>
+          </a:prstGeom>
+          <a:noFill/>
+          <a:extLst>
+            <a:ext uri="{909E8E84-426E-40DD-AFC4-6F175D3DCCD1}">
+              <a14:hiddenFill xmlns:a14="http://schemas.microsoft.com/office/drawing/2010/main">
+                <a:solidFill>
+                  <a:srgbClr val="FFFFFF"/>
+                </a:solidFill>
+              </a14:hiddenFill>
+            </a:ext>
+          </a:extLst>
+        </p:spPr>
+      </p:pic>
+      <p:sp>
+        <p:nvSpPr>
+          <p:cNvPr id="4" name="AutoShape 4" descr="Image result for HC-SR501"/>
+          <p:cNvSpPr>
+            <a:spLocks noChangeAspect="1" noChangeArrowheads="1"/>
+          </p:cNvSpPr>
+          <p:nvPr/>
+        </p:nvSpPr>
+        <p:spPr bwMode="auto">
+          <a:xfrm>
+            <a:off x="155575" y="-144463"/>
+            <a:ext cx="385762" cy="385763"/>
+          </a:xfrm>
+          <a:prstGeom prst="rect">
+            <a:avLst/>
+          </a:prstGeom>
+          <a:noFill/>
+          <a:extLst>
+            <a:ext uri="{909E8E84-426E-40DD-AFC4-6F175D3DCCD1}">
+              <a14:hiddenFill xmlns:a14="http://schemas.microsoft.com/office/drawing/2010/main">
+                <a:solidFill>
+                  <a:srgbClr val="FFFFFF"/>
+                </a:solidFill>
+              </a14:hiddenFill>
+            </a:ext>
+          </a:extLst>
+        </p:spPr>
+        <p:txBody>
+          <a:bodyPr vert="horz" wrap="square" lIns="91440" tIns="45720" rIns="91440" bIns="45720" numCol="1" anchor="t" anchorCtr="0" compatLnSpc="1">
+            <a:prstTxWarp prst="textNoShape">
+              <a:avLst/>
+            </a:prstTxWarp>
+          </a:bodyPr>
+          <a:lstStyle/>
+          <a:p>
+            <a:endParaRPr lang="en-US"/>
+          </a:p>
+        </p:txBody>
+      </p:sp>
+      <p:pic>
+        <p:nvPicPr>
+          <p:cNvPr id="1032" name="Picture 8" descr="Image result for HC-SR501"/>
+          <p:cNvPicPr>
+            <a:picLocks noChangeAspect="1" noChangeArrowheads="1"/>
+          </p:cNvPicPr>
+          <p:nvPr/>
+        </p:nvPicPr>
+        <p:blipFill>
+          <a:blip r:embed="rId4">
+            <a:extLst>
+              <a:ext uri="{28A0092B-C50C-407E-A947-70E740481C1C}">
+                <a14:useLocalDpi xmlns:a14="http://schemas.microsoft.com/office/drawing/2010/main" val="0"/>
+              </a:ext>
+            </a:extLst>
+          </a:blip>
+          <a:srcRect/>
+          <a:stretch>
+            <a:fillRect/>
+          </a:stretch>
+        </p:blipFill>
+        <p:spPr bwMode="auto">
+          <a:xfrm>
+            <a:off x="5155980" y="3095119"/>
+            <a:ext cx="3474632" cy="3474632"/>
+          </a:xfrm>
+          <a:prstGeom prst="rect">
+            <a:avLst/>
+          </a:prstGeom>
+          <a:noFill/>
+          <a:extLst>
+            <a:ext uri="{909E8E84-426E-40DD-AFC4-6F175D3DCCD1}">
+              <a14:hiddenFill xmlns:a14="http://schemas.microsoft.com/office/drawing/2010/main">
+                <a:solidFill>
+                  <a:srgbClr val="FFFFFF"/>
+                </a:solidFill>
+              </a14:hiddenFill>
+            </a:ext>
+          </a:extLst>
+        </p:spPr>
+      </p:pic>
+      <p:pic>
+        <p:nvPicPr>
+          <p:cNvPr id="1034" name="Picture 10" descr="Image result for google calendar"/>
+          <p:cNvPicPr>
+            <a:picLocks noChangeAspect="1" noChangeArrowheads="1"/>
+          </p:cNvPicPr>
+          <p:nvPr/>
+        </p:nvPicPr>
+        <p:blipFill>
+          <a:blip r:embed="rId5">
+            <a:extLst>
+              <a:ext uri="{28A0092B-C50C-407E-A947-70E740481C1C}">
+                <a14:useLocalDpi xmlns:a14="http://schemas.microsoft.com/office/drawing/2010/main" val="0"/>
+              </a:ext>
+            </a:extLst>
+          </a:blip>
+          <a:srcRect/>
+          <a:stretch>
+            <a:fillRect/>
+          </a:stretch>
+        </p:blipFill>
+        <p:spPr bwMode="auto">
+          <a:xfrm>
+            <a:off x="1546968" y="3763652"/>
+            <a:ext cx="2558597" cy="2558597"/>
+          </a:xfrm>
+          <a:prstGeom prst="rect">
+            <a:avLst/>
+          </a:prstGeom>
+          <a:noFill/>
+          <a:extLst>
+            <a:ext uri="{909E8E84-426E-40DD-AFC4-6F175D3DCCD1}">
+              <a14:hiddenFill xmlns:a14="http://schemas.microsoft.com/office/drawing/2010/main">
+                <a:solidFill>
+                  <a:srgbClr val="FFFFFF"/>
+                </a:solidFill>
+              </a14:hiddenFill>
+            </a:ext>
+          </a:extLst>
+        </p:spPr>
+      </p:pic>
     </p:spTree>
     <p:extLst>
       <p:ext uri="{BB962C8B-B14F-4D97-AF65-F5344CB8AC3E}">
-        <p14:creationId xmlns:p14="http://schemas.microsoft.com/office/powerpoint/2010/main" val="462958550"/>
+        <p14:creationId xmlns:p14="http://schemas.microsoft.com/office/powerpoint/2010/main" val="3658949672"/>
       </p:ext>
     </p:extLst>
   </p:cSld>
@@ -12624,7 +12900,7 @@
           <a:p>
             <a:r>
               <a:rPr lang="en-US" dirty="0" smtClean="0"/>
-              <a:t>services</a:t>
+              <a:t>outputs</a:t>
             </a:r>
             <a:endParaRPr lang="en-US" dirty="0"/>
           </a:p>
@@ -12645,14 +12921,141 @@
           <a:bodyPr/>
           <a:lstStyle/>
           <a:p>
-            <a:endParaRPr lang="en-US"/>
+            <a:r>
+              <a:rPr lang="en-US" dirty="0" smtClean="0"/>
+              <a:t>RGB LED Module</a:t>
+            </a:r>
+          </a:p>
+          <a:p>
+            <a:r>
+              <a:rPr lang="en-US" dirty="0" smtClean="0"/>
+              <a:t>PS3 Eye camera video</a:t>
+            </a:r>
+          </a:p>
+          <a:p>
+            <a:r>
+              <a:rPr lang="en-US" dirty="0" smtClean="0"/>
+              <a:t>Web user interface</a:t>
+            </a:r>
+          </a:p>
+          <a:p>
+            <a:r>
+              <a:rPr lang="en-US" dirty="0" smtClean="0"/>
+              <a:t>MMS Notifications</a:t>
+            </a:r>
           </a:p>
         </p:txBody>
       </p:sp>
+      <p:pic>
+        <p:nvPicPr>
+          <p:cNvPr id="2050" name="Picture 2" descr="Image result for RGB led module"/>
+          <p:cNvPicPr>
+            <a:picLocks noChangeAspect="1" noChangeArrowheads="1"/>
+          </p:cNvPicPr>
+          <p:nvPr/>
+        </p:nvPicPr>
+        <p:blipFill>
+          <a:blip r:embed="rId2">
+            <a:extLst>
+              <a:ext uri="{28A0092B-C50C-407E-A947-70E740481C1C}">
+                <a14:useLocalDpi xmlns:a14="http://schemas.microsoft.com/office/drawing/2010/main" val="0"/>
+              </a:ext>
+            </a:extLst>
+          </a:blip>
+          <a:srcRect/>
+          <a:stretch>
+            <a:fillRect/>
+          </a:stretch>
+        </p:blipFill>
+        <p:spPr bwMode="auto">
+          <a:xfrm>
+            <a:off x="4309801" y="3431330"/>
+            <a:ext cx="3245161" cy="3115137"/>
+          </a:xfrm>
+          <a:prstGeom prst="rect">
+            <a:avLst/>
+          </a:prstGeom>
+          <a:noFill/>
+          <a:extLst>
+            <a:ext uri="{909E8E84-426E-40DD-AFC4-6F175D3DCCD1}">
+              <a14:hiddenFill xmlns:a14="http://schemas.microsoft.com/office/drawing/2010/main">
+                <a:solidFill>
+                  <a:srgbClr val="FFFFFF"/>
+                </a:solidFill>
+              </a14:hiddenFill>
+            </a:ext>
+          </a:extLst>
+        </p:spPr>
+      </p:pic>
+      <p:pic>
+        <p:nvPicPr>
+          <p:cNvPr id="2052" name="Picture 4" descr="Image result for PS3 eye"/>
+          <p:cNvPicPr>
+            <a:picLocks noChangeAspect="1" noChangeArrowheads="1"/>
+          </p:cNvPicPr>
+          <p:nvPr/>
+        </p:nvPicPr>
+        <p:blipFill>
+          <a:blip r:embed="rId3">
+            <a:extLst>
+              <a:ext uri="{28A0092B-C50C-407E-A947-70E740481C1C}">
+                <a14:useLocalDpi xmlns:a14="http://schemas.microsoft.com/office/drawing/2010/main" val="0"/>
+              </a:ext>
+            </a:extLst>
+          </a:blip>
+          <a:srcRect/>
+          <a:stretch>
+            <a:fillRect/>
+          </a:stretch>
+        </p:blipFill>
+        <p:spPr bwMode="auto">
+          <a:xfrm>
+            <a:off x="4309801" y="548046"/>
+            <a:ext cx="3569220" cy="3098083"/>
+          </a:xfrm>
+          <a:prstGeom prst="rect">
+            <a:avLst/>
+          </a:prstGeom>
+          <a:noFill/>
+          <a:extLst>
+            <a:ext uri="{909E8E84-426E-40DD-AFC4-6F175D3DCCD1}">
+              <a14:hiddenFill xmlns:a14="http://schemas.microsoft.com/office/drawing/2010/main">
+                <a:solidFill>
+                  <a:srgbClr val="FFFFFF"/>
+                </a:solidFill>
+              </a14:hiddenFill>
+            </a:ext>
+          </a:extLst>
+        </p:spPr>
+      </p:pic>
+      <p:pic>
+        <p:nvPicPr>
+          <p:cNvPr id="5" name="Picture 4"/>
+          <p:cNvPicPr>
+            <a:picLocks noChangeAspect="1"/>
+          </p:cNvPicPr>
+          <p:nvPr/>
+        </p:nvPicPr>
+        <p:blipFill>
+          <a:blip r:embed="rId4"/>
+          <a:stretch>
+            <a:fillRect/>
+          </a:stretch>
+        </p:blipFill>
+        <p:spPr>
+          <a:xfrm>
+            <a:off x="7879021" y="1979254"/>
+            <a:ext cx="3541916" cy="3964346"/>
+          </a:xfrm>
+          <a:prstGeom prst="rect">
+            <a:avLst/>
+          </a:prstGeom>
+        </p:spPr>
+      </p:pic>
     </p:spTree>
     <p:extLst>
       <p:ext uri="{BB962C8B-B14F-4D97-AF65-F5344CB8AC3E}">
-        <p14:creationId xmlns:p14="http://schemas.microsoft.com/office/powerpoint/2010/main" val="2240589504"/>
+        <p14:creationId xmlns:p14="http://schemas.microsoft.com/office/powerpoint/2010/main" val="462958550"/>
       </p:ext>
     </p:extLst>
   </p:cSld>
@@ -12696,6 +13099,117 @@
           <a:p>
             <a:r>
               <a:rPr lang="en-US" dirty="0" smtClean="0"/>
+              <a:t>services</a:t>
+            </a:r>
+            <a:endParaRPr lang="en-US" dirty="0"/>
+          </a:p>
+        </p:txBody>
+      </p:sp>
+      <p:sp>
+        <p:nvSpPr>
+          <p:cNvPr id="3" name="Content Placeholder 2"/>
+          <p:cNvSpPr>
+            <a:spLocks noGrp="1"/>
+          </p:cNvSpPr>
+          <p:nvPr>
+            <p:ph idx="1"/>
+          </p:nvPr>
+        </p:nvSpPr>
+        <p:spPr/>
+        <p:txBody>
+          <a:bodyPr/>
+          <a:lstStyle/>
+          <a:p>
+            <a:r>
+              <a:rPr lang="en-US" dirty="0"/>
+              <a:t>Watson </a:t>
+            </a:r>
+            <a:r>
+              <a:rPr lang="en-US" dirty="0" smtClean="0"/>
+              <a:t>Graphs</a:t>
+            </a:r>
+          </a:p>
+          <a:p>
+            <a:r>
+              <a:rPr lang="en-US" dirty="0" smtClean="0"/>
+              <a:t>Motion project library</a:t>
+            </a:r>
+          </a:p>
+          <a:p>
+            <a:r>
+              <a:rPr lang="en-US" dirty="0" smtClean="0"/>
+              <a:t>Flask for UI</a:t>
+            </a:r>
+          </a:p>
+          <a:p>
+            <a:r>
+              <a:rPr lang="en-US" dirty="0" err="1" smtClean="0"/>
+              <a:t>Twilio</a:t>
+            </a:r>
+            <a:r>
+              <a:rPr lang="en-US" dirty="0" smtClean="0"/>
+              <a:t> API for notifications</a:t>
+            </a:r>
+          </a:p>
+          <a:p>
+            <a:r>
+              <a:rPr lang="en-US" dirty="0" smtClean="0"/>
+              <a:t>Google Calendar API </a:t>
+            </a:r>
+            <a:endParaRPr lang="en-US" dirty="0"/>
+          </a:p>
+          <a:p>
+            <a:endParaRPr lang="en-US" dirty="0"/>
+          </a:p>
+        </p:txBody>
+      </p:sp>
+    </p:spTree>
+    <p:extLst>
+      <p:ext uri="{BB962C8B-B14F-4D97-AF65-F5344CB8AC3E}">
+        <p14:creationId xmlns:p14="http://schemas.microsoft.com/office/powerpoint/2010/main" val="2240589504"/>
+      </p:ext>
+    </p:extLst>
+  </p:cSld>
+  <p:clrMapOvr>
+    <a:masterClrMapping/>
+  </p:clrMapOvr>
+</p:sld>
+</file>
+
+<file path=ppt/slides/slide6.xml><?xml version="1.0" encoding="utf-8"?>
+<p:sld xmlns:a="http://schemas.openxmlformats.org/drawingml/2006/main" xmlns:r="http://schemas.openxmlformats.org/officeDocument/2006/relationships" xmlns:p="http://schemas.openxmlformats.org/presentationml/2006/main">
+  <p:cSld>
+    <p:spTree>
+      <p:nvGrpSpPr>
+        <p:cNvPr id="1" name=""/>
+        <p:cNvGrpSpPr/>
+        <p:nvPr/>
+      </p:nvGrpSpPr>
+      <p:grpSpPr>
+        <a:xfrm>
+          <a:off x="0" y="0"/>
+          <a:ext cx="0" cy="0"/>
+          <a:chOff x="0" y="0"/>
+          <a:chExt cx="0" cy="0"/>
+        </a:xfrm>
+      </p:grpSpPr>
+      <p:sp>
+        <p:nvSpPr>
+          <p:cNvPr id="2" name="Title 1"/>
+          <p:cNvSpPr>
+            <a:spLocks noGrp="1"/>
+          </p:cNvSpPr>
+          <p:nvPr>
+            <p:ph type="title"/>
+          </p:nvPr>
+        </p:nvSpPr>
+        <p:spPr/>
+        <p:txBody>
+          <a:bodyPr/>
+          <a:lstStyle/>
+          <a:p>
+            <a:r>
+              <a:rPr lang="en-US" dirty="0" smtClean="0"/>
               <a:t>Demo – test scenarios 	</a:t>
             </a:r>
             <a:endParaRPr lang="en-US" dirty="0"/>
@@ -12715,7 +13229,7 @@
         <p:spPr/>
         <p:txBody>
           <a:bodyPr>
-            <a:normAutofit fontScale="92500" lnSpcReduction="10000"/>
+            <a:normAutofit fontScale="70000" lnSpcReduction="20000"/>
           </a:bodyPr>
           <a:lstStyle/>
           <a:p>
@@ -12756,7 +13270,11 @@
             </a:pPr>
             <a:r>
               <a:rPr lang="en-US" dirty="0" smtClean="0"/>
-              <a:t>View MMS</a:t>
+              <a:t>View </a:t>
+            </a:r>
+            <a:r>
+              <a:rPr lang="en-US" dirty="0" smtClean="0"/>
+              <a:t>MMS</a:t>
             </a:r>
           </a:p>
           <a:p>
@@ -12766,8 +13284,9 @@
             </a:pPr>
             <a:r>
               <a:rPr lang="en-US" dirty="0" smtClean="0"/>
-              <a:t>Disarm system</a:t>
-            </a:r>
+              <a:t>View live stream</a:t>
+            </a:r>
+            <a:endParaRPr lang="en-US" dirty="0" smtClean="0"/>
           </a:p>
           <a:p>
             <a:pPr marL="457200" indent="-457200">
@@ -12776,13 +13295,8 @@
             </a:pPr>
             <a:r>
               <a:rPr lang="en-US" dirty="0" smtClean="0"/>
-              <a:t>View UI to show status and test arming </a:t>
-            </a:r>
-            <a:r>
-              <a:rPr lang="en-US" smtClean="0"/>
-              <a:t>&amp; disarming</a:t>
-            </a:r>
-            <a:endParaRPr lang="en-US" dirty="0" smtClean="0"/>
+              <a:t>Disarm system</a:t>
+            </a:r>
           </a:p>
           <a:p>
             <a:pPr marL="457200" indent="-457200">
@@ -12791,7 +13305,36 @@
             </a:pPr>
             <a:r>
               <a:rPr lang="en-US" dirty="0" smtClean="0"/>
-              <a:t>View Watson graphs</a:t>
+              <a:t>View UI to show status and test arming &amp; </a:t>
+            </a:r>
+            <a:r>
+              <a:rPr lang="en-US" dirty="0" smtClean="0"/>
+              <a:t>disarming</a:t>
+            </a:r>
+            <a:endParaRPr lang="en-US" dirty="0" smtClean="0"/>
+          </a:p>
+          <a:p>
+            <a:pPr marL="457200" indent="-457200">
+              <a:buFont typeface="+mj-lt"/>
+              <a:buAutoNum type="arabicPeriod"/>
+            </a:pPr>
+            <a:r>
+              <a:rPr lang="en-US" dirty="0" smtClean="0"/>
+              <a:t>View Watson </a:t>
+            </a:r>
+            <a:r>
+              <a:rPr lang="en-US" dirty="0" smtClean="0"/>
+              <a:t>graphs</a:t>
+            </a:r>
+          </a:p>
+          <a:p>
+            <a:pPr marL="457200" indent="-457200">
+              <a:buFont typeface="+mj-lt"/>
+              <a:buAutoNum type="arabicPeriod"/>
+            </a:pPr>
+            <a:r>
+              <a:rPr lang="en-US" dirty="0" smtClean="0"/>
+              <a:t>Automated and remote testing</a:t>
             </a:r>
             <a:endParaRPr lang="en-US" dirty="0"/>
           </a:p>

</xml_diff>

<commit_message>
Moving PS3 Eye over to inputs
</commit_message>
<xml_diff>
--- a/proposal/Smart Security System_presentation.pptx
+++ b/proposal/Smart Security System_presentation.pptx
@@ -167,7 +167,7 @@
           <a:noFill/>
           <a:extLst>
             <a:ext uri="{909E8E84-426E-40dd-AFC4-6F175D3DCCD1}">
-              <a14:hiddenFill xmlns="" xmlns:a14="http://schemas.microsoft.com/office/drawing/2010/main">
+              <a14:hiddenFill xmlns:a14="http://schemas.microsoft.com/office/drawing/2010/main" xmlns="">
                 <a:solidFill>
                   <a:srgbClr val="FFFFFF"/>
                 </a:solidFill>
@@ -227,7 +227,7 @@
             </a:ln>
             <a:extLst>
               <a:ext uri="{91240B29-F687-4f45-9708-019B960494DF}">
-                <a14:hiddenLine xmlns="" xmlns:a14="http://schemas.microsoft.com/office/drawing/2010/main" w="9525">
+                <a14:hiddenLine xmlns:a14="http://schemas.microsoft.com/office/drawing/2010/main" xmlns="" w="9525">
                   <a:solidFill>
                     <a:srgbClr val="000000"/>
                   </a:solidFill>
@@ -317,7 +317,7 @@
             </a:ln>
             <a:extLst>
               <a:ext uri="{91240B29-F687-4f45-9708-019B960494DF}">
-                <a14:hiddenLine xmlns="" xmlns:a14="http://schemas.microsoft.com/office/drawing/2010/main" w="9525">
+                <a14:hiddenLine xmlns:a14="http://schemas.microsoft.com/office/drawing/2010/main" xmlns="" w="9525">
                   <a:solidFill>
                     <a:srgbClr val="000000"/>
                   </a:solidFill>
@@ -407,7 +407,7 @@
             </a:ln>
             <a:extLst>
               <a:ext uri="{91240B29-F687-4f45-9708-019B960494DF}">
-                <a14:hiddenLine xmlns="" xmlns:a14="http://schemas.microsoft.com/office/drawing/2010/main" w="9525">
+                <a14:hiddenLine xmlns:a14="http://schemas.microsoft.com/office/drawing/2010/main" xmlns="" w="9525">
                   <a:solidFill>
                     <a:srgbClr val="000000"/>
                   </a:solidFill>
@@ -441,7 +441,7 @@
             </a:ln>
             <a:extLst>
               <a:ext uri="{91240B29-F687-4f45-9708-019B960494DF}">
-                <a14:hiddenLine xmlns="" xmlns:a14="http://schemas.microsoft.com/office/drawing/2010/main" w="9525">
+                <a14:hiddenLine xmlns:a14="http://schemas.microsoft.com/office/drawing/2010/main" xmlns="" w="9525">
                   <a:solidFill>
                     <a:srgbClr val="000000"/>
                   </a:solidFill>
@@ -531,7 +531,7 @@
             </a:ln>
             <a:extLst>
               <a:ext uri="{91240B29-F687-4f45-9708-019B960494DF}">
-                <a14:hiddenLine xmlns="" xmlns:a14="http://schemas.microsoft.com/office/drawing/2010/main" w="9525">
+                <a14:hiddenLine xmlns:a14="http://schemas.microsoft.com/office/drawing/2010/main" xmlns="" w="9525">
                   <a:solidFill>
                     <a:srgbClr val="000000"/>
                   </a:solidFill>
@@ -593,7 +593,7 @@
             </a:ln>
             <a:extLst>
               <a:ext uri="{91240B29-F687-4f45-9708-019B960494DF}">
-                <a14:hiddenLine xmlns="" xmlns:a14="http://schemas.microsoft.com/office/drawing/2010/main" w="9525">
+                <a14:hiddenLine xmlns:a14="http://schemas.microsoft.com/office/drawing/2010/main" xmlns="" w="9525">
                   <a:solidFill>
                     <a:srgbClr val="000000"/>
                   </a:solidFill>
@@ -655,7 +655,7 @@
             </a:ln>
             <a:extLst>
               <a:ext uri="{91240B29-F687-4f45-9708-019B960494DF}">
-                <a14:hiddenLine xmlns="" xmlns:a14="http://schemas.microsoft.com/office/drawing/2010/main" w="9525">
+                <a14:hiddenLine xmlns:a14="http://schemas.microsoft.com/office/drawing/2010/main" xmlns="" w="9525">
                   <a:solidFill>
                     <a:srgbClr val="000000"/>
                   </a:solidFill>
@@ -745,7 +745,7 @@
             </a:ln>
             <a:extLst>
               <a:ext uri="{91240B29-F687-4f45-9708-019B960494DF}">
-                <a14:hiddenLine xmlns="" xmlns:a14="http://schemas.microsoft.com/office/drawing/2010/main" w="9525">
+                <a14:hiddenLine xmlns:a14="http://schemas.microsoft.com/office/drawing/2010/main" xmlns="" w="9525">
                   <a:solidFill>
                     <a:srgbClr val="000000"/>
                   </a:solidFill>
@@ -807,7 +807,7 @@
             </a:ln>
             <a:extLst>
               <a:ext uri="{91240B29-F687-4f45-9708-019B960494DF}">
-                <a14:hiddenLine xmlns="" xmlns:a14="http://schemas.microsoft.com/office/drawing/2010/main" w="9525">
+                <a14:hiddenLine xmlns:a14="http://schemas.microsoft.com/office/drawing/2010/main" xmlns="" w="9525">
                   <a:solidFill>
                     <a:srgbClr val="000000"/>
                   </a:solidFill>
@@ -869,7 +869,7 @@
             </a:ln>
             <a:extLst>
               <a:ext uri="{91240B29-F687-4f45-9708-019B960494DF}">
-                <a14:hiddenLine xmlns="" xmlns:a14="http://schemas.microsoft.com/office/drawing/2010/main" w="9525">
+                <a14:hiddenLine xmlns:a14="http://schemas.microsoft.com/office/drawing/2010/main" xmlns="" w="9525">
                   <a:solidFill>
                     <a:srgbClr val="000000"/>
                   </a:solidFill>
@@ -959,7 +959,7 @@
             </a:ln>
             <a:extLst>
               <a:ext uri="{91240B29-F687-4f45-9708-019B960494DF}">
-                <a14:hiddenLine xmlns="" xmlns:a14="http://schemas.microsoft.com/office/drawing/2010/main" w="9525">
+                <a14:hiddenLine xmlns:a14="http://schemas.microsoft.com/office/drawing/2010/main" xmlns="" w="9525">
                   <a:solidFill>
                     <a:srgbClr val="000000"/>
                   </a:solidFill>
@@ -1049,7 +1049,7 @@
             </a:ln>
             <a:extLst>
               <a:ext uri="{91240B29-F687-4f45-9708-019B960494DF}">
-                <a14:hiddenLine xmlns="" xmlns:a14="http://schemas.microsoft.com/office/drawing/2010/main" w="9525">
+                <a14:hiddenLine xmlns:a14="http://schemas.microsoft.com/office/drawing/2010/main" xmlns="" w="9525">
                   <a:solidFill>
                     <a:srgbClr val="000000"/>
                   </a:solidFill>
@@ -1111,7 +1111,7 @@
             </a:ln>
             <a:extLst>
               <a:ext uri="{91240B29-F687-4f45-9708-019B960494DF}">
-                <a14:hiddenLine xmlns="" xmlns:a14="http://schemas.microsoft.com/office/drawing/2010/main" w="9525">
+                <a14:hiddenLine xmlns:a14="http://schemas.microsoft.com/office/drawing/2010/main" xmlns="" w="9525">
                   <a:solidFill>
                     <a:srgbClr val="000000"/>
                   </a:solidFill>
@@ -1221,7 +1221,7 @@
             </a:ln>
             <a:extLst>
               <a:ext uri="{91240B29-F687-4f45-9708-019B960494DF}">
-                <a14:hiddenLine xmlns="" xmlns:a14="http://schemas.microsoft.com/office/drawing/2010/main" w="9525">
+                <a14:hiddenLine xmlns:a14="http://schemas.microsoft.com/office/drawing/2010/main" xmlns="" w="9525">
                   <a:solidFill>
                     <a:srgbClr val="000000"/>
                   </a:solidFill>
@@ -1283,7 +1283,7 @@
             </a:ln>
             <a:extLst>
               <a:ext uri="{91240B29-F687-4f45-9708-019B960494DF}">
-                <a14:hiddenLine xmlns="" xmlns:a14="http://schemas.microsoft.com/office/drawing/2010/main" w="9525">
+                <a14:hiddenLine xmlns:a14="http://schemas.microsoft.com/office/drawing/2010/main" xmlns="" w="9525">
                   <a:solidFill>
                     <a:srgbClr val="000000"/>
                   </a:solidFill>
@@ -1373,7 +1373,7 @@
             </a:ln>
             <a:extLst>
               <a:ext uri="{91240B29-F687-4f45-9708-019B960494DF}">
-                <a14:hiddenLine xmlns="" xmlns:a14="http://schemas.microsoft.com/office/drawing/2010/main" w="9525">
+                <a14:hiddenLine xmlns:a14="http://schemas.microsoft.com/office/drawing/2010/main" xmlns="" w="9525">
                   <a:solidFill>
                     <a:srgbClr val="000000"/>
                   </a:solidFill>
@@ -1463,7 +1463,7 @@
             </a:ln>
             <a:extLst>
               <a:ext uri="{91240B29-F687-4f45-9708-019B960494DF}">
-                <a14:hiddenLine xmlns="" xmlns:a14="http://schemas.microsoft.com/office/drawing/2010/main" w="9525">
+                <a14:hiddenLine xmlns:a14="http://schemas.microsoft.com/office/drawing/2010/main" xmlns="" w="9525">
                   <a:solidFill>
                     <a:srgbClr val="000000"/>
                   </a:solidFill>
@@ -1525,7 +1525,7 @@
             </a:ln>
             <a:extLst>
               <a:ext uri="{91240B29-F687-4f45-9708-019B960494DF}">
-                <a14:hiddenLine xmlns="" xmlns:a14="http://schemas.microsoft.com/office/drawing/2010/main" w="9525">
+                <a14:hiddenLine xmlns:a14="http://schemas.microsoft.com/office/drawing/2010/main" xmlns="" w="9525">
                   <a:solidFill>
                     <a:srgbClr val="000000"/>
                   </a:solidFill>
@@ -1615,7 +1615,7 @@
             </a:ln>
             <a:extLst>
               <a:ext uri="{91240B29-F687-4f45-9708-019B960494DF}">
-                <a14:hiddenLine xmlns="" xmlns:a14="http://schemas.microsoft.com/office/drawing/2010/main" w="9525">
+                <a14:hiddenLine xmlns:a14="http://schemas.microsoft.com/office/drawing/2010/main" xmlns="" w="9525">
                   <a:solidFill>
                     <a:srgbClr val="000000"/>
                   </a:solidFill>
@@ -1705,7 +1705,7 @@
             </a:ln>
             <a:extLst>
               <a:ext uri="{91240B29-F687-4f45-9708-019B960494DF}">
-                <a14:hiddenLine xmlns="" xmlns:a14="http://schemas.microsoft.com/office/drawing/2010/main" w="9525">
+                <a14:hiddenLine xmlns:a14="http://schemas.microsoft.com/office/drawing/2010/main" xmlns="" w="9525">
                   <a:solidFill>
                     <a:srgbClr val="000000"/>
                   </a:solidFill>
@@ -1761,7 +1761,7 @@
             </a:ln>
             <a:extLst>
               <a:ext uri="{91240B29-F687-4f45-9708-019B960494DF}">
-                <a14:hiddenLine xmlns="" xmlns:a14="http://schemas.microsoft.com/office/drawing/2010/main" w="9525">
+                <a14:hiddenLine xmlns:a14="http://schemas.microsoft.com/office/drawing/2010/main" xmlns="" w="9525">
                   <a:solidFill>
                     <a:srgbClr val="000000"/>
                   </a:solidFill>
@@ -1851,7 +1851,7 @@
             </a:ln>
             <a:extLst>
               <a:ext uri="{91240B29-F687-4f45-9708-019B960494DF}">
-                <a14:hiddenLine xmlns="" xmlns:a14="http://schemas.microsoft.com/office/drawing/2010/main" w="9525">
+                <a14:hiddenLine xmlns:a14="http://schemas.microsoft.com/office/drawing/2010/main" xmlns="" w="9525">
                   <a:solidFill>
                     <a:srgbClr val="000000"/>
                   </a:solidFill>
@@ -1907,7 +1907,7 @@
             </a:ln>
             <a:extLst>
               <a:ext uri="{91240B29-F687-4f45-9708-019B960494DF}">
-                <a14:hiddenLine xmlns="" xmlns:a14="http://schemas.microsoft.com/office/drawing/2010/main" w="9525">
+                <a14:hiddenLine xmlns:a14="http://schemas.microsoft.com/office/drawing/2010/main" xmlns="" w="9525">
                   <a:solidFill>
                     <a:srgbClr val="000000"/>
                   </a:solidFill>
@@ -1997,7 +1997,7 @@
             </a:ln>
             <a:extLst>
               <a:ext uri="{91240B29-F687-4f45-9708-019B960494DF}">
-                <a14:hiddenLine xmlns="" xmlns:a14="http://schemas.microsoft.com/office/drawing/2010/main" w="9525">
+                <a14:hiddenLine xmlns:a14="http://schemas.microsoft.com/office/drawing/2010/main" xmlns="" w="9525">
                   <a:solidFill>
                     <a:srgbClr val="000000"/>
                   </a:solidFill>
@@ -2065,7 +2065,7 @@
             </a:ln>
             <a:extLst>
               <a:ext uri="{91240B29-F687-4f45-9708-019B960494DF}">
-                <a14:hiddenLine xmlns="" xmlns:a14="http://schemas.microsoft.com/office/drawing/2010/main" w="9525">
+                <a14:hiddenLine xmlns:a14="http://schemas.microsoft.com/office/drawing/2010/main" xmlns="" w="9525">
                   <a:solidFill>
                     <a:srgbClr val="000000"/>
                   </a:solidFill>
@@ -2155,7 +2155,7 @@
             </a:ln>
             <a:extLst>
               <a:ext uri="{91240B29-F687-4f45-9708-019B960494DF}">
-                <a14:hiddenLine xmlns="" xmlns:a14="http://schemas.microsoft.com/office/drawing/2010/main" w="9525">
+                <a14:hiddenLine xmlns:a14="http://schemas.microsoft.com/office/drawing/2010/main" xmlns="" w="9525">
                   <a:solidFill>
                     <a:srgbClr val="000000"/>
                   </a:solidFill>
@@ -2223,7 +2223,7 @@
             </a:ln>
             <a:extLst>
               <a:ext uri="{91240B29-F687-4f45-9708-019B960494DF}">
-                <a14:hiddenLine xmlns="" xmlns:a14="http://schemas.microsoft.com/office/drawing/2010/main" w="9525">
+                <a14:hiddenLine xmlns:a14="http://schemas.microsoft.com/office/drawing/2010/main" xmlns="" w="9525">
                   <a:solidFill>
                     <a:srgbClr val="000000"/>
                   </a:solidFill>
@@ -2313,7 +2313,7 @@
             </a:ln>
             <a:extLst>
               <a:ext uri="{91240B29-F687-4f45-9708-019B960494DF}">
-                <a14:hiddenLine xmlns="" xmlns:a14="http://schemas.microsoft.com/office/drawing/2010/main" w="9525">
+                <a14:hiddenLine xmlns:a14="http://schemas.microsoft.com/office/drawing/2010/main" xmlns="" w="9525">
                   <a:solidFill>
                     <a:srgbClr val="000000"/>
                   </a:solidFill>
@@ -2347,7 +2347,7 @@
             </a:ln>
             <a:extLst>
               <a:ext uri="{91240B29-F687-4f45-9708-019B960494DF}">
-                <a14:hiddenLine xmlns="" xmlns:a14="http://schemas.microsoft.com/office/drawing/2010/main" w="9525">
+                <a14:hiddenLine xmlns:a14="http://schemas.microsoft.com/office/drawing/2010/main" xmlns="" w="9525">
                   <a:solidFill>
                     <a:srgbClr val="000000"/>
                   </a:solidFill>
@@ -2437,7 +2437,7 @@
             </a:ln>
             <a:extLst>
               <a:ext uri="{91240B29-F687-4f45-9708-019B960494DF}">
-                <a14:hiddenLine xmlns="" xmlns:a14="http://schemas.microsoft.com/office/drawing/2010/main" w="9525">
+                <a14:hiddenLine xmlns:a14="http://schemas.microsoft.com/office/drawing/2010/main" xmlns="" w="9525">
                   <a:solidFill>
                     <a:srgbClr val="000000"/>
                   </a:solidFill>
@@ -2499,7 +2499,7 @@
             </a:ln>
             <a:extLst>
               <a:ext uri="{91240B29-F687-4f45-9708-019B960494DF}">
-                <a14:hiddenLine xmlns="" xmlns:a14="http://schemas.microsoft.com/office/drawing/2010/main" w="9525">
+                <a14:hiddenLine xmlns:a14="http://schemas.microsoft.com/office/drawing/2010/main" xmlns="" w="9525">
                   <a:solidFill>
                     <a:srgbClr val="000000"/>
                   </a:solidFill>
@@ -2561,7 +2561,7 @@
             </a:ln>
             <a:extLst>
               <a:ext uri="{91240B29-F687-4f45-9708-019B960494DF}">
-                <a14:hiddenLine xmlns="" xmlns:a14="http://schemas.microsoft.com/office/drawing/2010/main" w="9525">
+                <a14:hiddenLine xmlns:a14="http://schemas.microsoft.com/office/drawing/2010/main" xmlns="" w="9525">
                   <a:solidFill>
                     <a:srgbClr val="000000"/>
                   </a:solidFill>
@@ -2651,7 +2651,7 @@
             </a:ln>
             <a:extLst>
               <a:ext uri="{91240B29-F687-4f45-9708-019B960494DF}">
-                <a14:hiddenLine xmlns="" xmlns:a14="http://schemas.microsoft.com/office/drawing/2010/main" w="9525">
+                <a14:hiddenLine xmlns:a14="http://schemas.microsoft.com/office/drawing/2010/main" xmlns="" w="9525">
                   <a:solidFill>
                     <a:srgbClr val="000000"/>
                   </a:solidFill>
@@ -2719,7 +2719,7 @@
             </a:ln>
             <a:extLst>
               <a:ext uri="{91240B29-F687-4f45-9708-019B960494DF}">
-                <a14:hiddenLine xmlns="" xmlns:a14="http://schemas.microsoft.com/office/drawing/2010/main" w="9525">
+                <a14:hiddenLine xmlns:a14="http://schemas.microsoft.com/office/drawing/2010/main" xmlns="" w="9525">
                   <a:solidFill>
                     <a:srgbClr val="000000"/>
                   </a:solidFill>
@@ -2781,7 +2781,7 @@
             </a:ln>
             <a:extLst>
               <a:ext uri="{91240B29-F687-4f45-9708-019B960494DF}">
-                <a14:hiddenLine xmlns="" xmlns:a14="http://schemas.microsoft.com/office/drawing/2010/main" w="9525">
+                <a14:hiddenLine xmlns:a14="http://schemas.microsoft.com/office/drawing/2010/main" xmlns="" w="9525">
                   <a:solidFill>
                     <a:srgbClr val="000000"/>
                   </a:solidFill>
@@ -2871,7 +2871,7 @@
             </a:ln>
             <a:extLst>
               <a:ext uri="{91240B29-F687-4f45-9708-019B960494DF}">
-                <a14:hiddenLine xmlns="" xmlns:a14="http://schemas.microsoft.com/office/drawing/2010/main" w="9525">
+                <a14:hiddenLine xmlns:a14="http://schemas.microsoft.com/office/drawing/2010/main" xmlns="" w="9525">
                   <a:solidFill>
                     <a:srgbClr val="000000"/>
                   </a:solidFill>
@@ -2933,7 +2933,7 @@
             </a:ln>
             <a:extLst>
               <a:ext uri="{91240B29-F687-4f45-9708-019B960494DF}">
-                <a14:hiddenLine xmlns="" xmlns:a14="http://schemas.microsoft.com/office/drawing/2010/main" w="9525">
+                <a14:hiddenLine xmlns:a14="http://schemas.microsoft.com/office/drawing/2010/main" xmlns="" w="9525">
                   <a:solidFill>
                     <a:srgbClr val="000000"/>
                   </a:solidFill>
@@ -3023,7 +3023,7 @@
             </a:ln>
             <a:extLst>
               <a:ext uri="{91240B29-F687-4f45-9708-019B960494DF}">
-                <a14:hiddenLine xmlns="" xmlns:a14="http://schemas.microsoft.com/office/drawing/2010/main" w="9525">
+                <a14:hiddenLine xmlns:a14="http://schemas.microsoft.com/office/drawing/2010/main" xmlns="" w="9525">
                   <a:solidFill>
                     <a:srgbClr val="000000"/>
                   </a:solidFill>
@@ -3085,7 +3085,7 @@
             </a:ln>
             <a:extLst>
               <a:ext uri="{91240B29-F687-4f45-9708-019B960494DF}">
-                <a14:hiddenLine xmlns="" xmlns:a14="http://schemas.microsoft.com/office/drawing/2010/main" w="9525">
+                <a14:hiddenLine xmlns:a14="http://schemas.microsoft.com/office/drawing/2010/main" xmlns="" w="9525">
                   <a:solidFill>
                     <a:srgbClr val="000000"/>
                   </a:solidFill>
@@ -3175,7 +3175,7 @@
             </a:ln>
             <a:extLst>
               <a:ext uri="{91240B29-F687-4f45-9708-019B960494DF}">
-                <a14:hiddenLine xmlns="" xmlns:a14="http://schemas.microsoft.com/office/drawing/2010/main" w="9525">
+                <a14:hiddenLine xmlns:a14="http://schemas.microsoft.com/office/drawing/2010/main" xmlns="" w="9525">
                   <a:solidFill>
                     <a:srgbClr val="000000"/>
                   </a:solidFill>
@@ -3209,7 +3209,7 @@
             </a:ln>
             <a:extLst>
               <a:ext uri="{91240B29-F687-4f45-9708-019B960494DF}">
-                <a14:hiddenLine xmlns="" xmlns:a14="http://schemas.microsoft.com/office/drawing/2010/main" w="9525">
+                <a14:hiddenLine xmlns:a14="http://schemas.microsoft.com/office/drawing/2010/main" xmlns="" w="9525">
                   <a:solidFill>
                     <a:srgbClr val="000000"/>
                   </a:solidFill>
@@ -3274,7 +3274,7 @@
             </a:ln>
             <a:extLst>
               <a:ext uri="{91240B29-F687-4f45-9708-019B960494DF}">
-                <a14:hiddenLine xmlns="" xmlns:a14="http://schemas.microsoft.com/office/drawing/2010/main" w="9525">
+                <a14:hiddenLine xmlns:a14="http://schemas.microsoft.com/office/drawing/2010/main" xmlns="" w="9525">
                   <a:solidFill>
                     <a:srgbClr val="000000"/>
                   </a:solidFill>
@@ -3364,7 +3364,7 @@
             </a:ln>
             <a:extLst>
               <a:ext uri="{91240B29-F687-4f45-9708-019B960494DF}">
-                <a14:hiddenLine xmlns="" xmlns:a14="http://schemas.microsoft.com/office/drawing/2010/main" w="9525">
+                <a14:hiddenLine xmlns:a14="http://schemas.microsoft.com/office/drawing/2010/main" xmlns="" w="9525">
                   <a:solidFill>
                     <a:srgbClr val="000000"/>
                   </a:solidFill>
@@ -3426,7 +3426,7 @@
             </a:ln>
             <a:extLst>
               <a:ext uri="{91240B29-F687-4f45-9708-019B960494DF}">
-                <a14:hiddenLine xmlns="" xmlns:a14="http://schemas.microsoft.com/office/drawing/2010/main" w="9525">
+                <a14:hiddenLine xmlns:a14="http://schemas.microsoft.com/office/drawing/2010/main" xmlns="" w="9525">
                   <a:solidFill>
                     <a:srgbClr val="000000"/>
                   </a:solidFill>
@@ -3516,7 +3516,7 @@
             </a:ln>
             <a:extLst>
               <a:ext uri="{91240B29-F687-4f45-9708-019B960494DF}">
-                <a14:hiddenLine xmlns="" xmlns:a14="http://schemas.microsoft.com/office/drawing/2010/main" w="9525">
+                <a14:hiddenLine xmlns:a14="http://schemas.microsoft.com/office/drawing/2010/main" xmlns="" w="9525">
                   <a:solidFill>
                     <a:srgbClr val="000000"/>
                   </a:solidFill>
@@ -3606,7 +3606,7 @@
             </a:ln>
             <a:extLst>
               <a:ext uri="{91240B29-F687-4f45-9708-019B960494DF}">
-                <a14:hiddenLine xmlns="" xmlns:a14="http://schemas.microsoft.com/office/drawing/2010/main" w="9525">
+                <a14:hiddenLine xmlns:a14="http://schemas.microsoft.com/office/drawing/2010/main" xmlns="" w="9525">
                   <a:solidFill>
                     <a:srgbClr val="000000"/>
                   </a:solidFill>
@@ -3671,7 +3671,7 @@
             </a:ln>
             <a:extLst>
               <a:ext uri="{91240B29-F687-4f45-9708-019B960494DF}">
-                <a14:hiddenLine xmlns="" xmlns:a14="http://schemas.microsoft.com/office/drawing/2010/main" w="9525">
+                <a14:hiddenLine xmlns:a14="http://schemas.microsoft.com/office/drawing/2010/main" xmlns="" w="9525">
                   <a:solidFill>
                     <a:srgbClr val="000000"/>
                   </a:solidFill>
@@ -3733,7 +3733,7 @@
             </a:ln>
             <a:extLst>
               <a:ext uri="{91240B29-F687-4f45-9708-019B960494DF}">
-                <a14:hiddenLine xmlns="" xmlns:a14="http://schemas.microsoft.com/office/drawing/2010/main" w="9525">
+                <a14:hiddenLine xmlns:a14="http://schemas.microsoft.com/office/drawing/2010/main" xmlns="" w="9525">
                   <a:solidFill>
                     <a:srgbClr val="000000"/>
                   </a:solidFill>
@@ -3823,7 +3823,7 @@
             </a:ln>
             <a:extLst>
               <a:ext uri="{91240B29-F687-4f45-9708-019B960494DF}">
-                <a14:hiddenLine xmlns="" xmlns:a14="http://schemas.microsoft.com/office/drawing/2010/main" w="9525">
+                <a14:hiddenLine xmlns:a14="http://schemas.microsoft.com/office/drawing/2010/main" xmlns="" w="9525">
                   <a:solidFill>
                     <a:srgbClr val="000000"/>
                   </a:solidFill>
@@ -3913,7 +3913,7 @@
             </a:ln>
             <a:extLst>
               <a:ext uri="{91240B29-F687-4f45-9708-019B960494DF}">
-                <a14:hiddenLine xmlns="" xmlns:a14="http://schemas.microsoft.com/office/drawing/2010/main" w="9525">
+                <a14:hiddenLine xmlns:a14="http://schemas.microsoft.com/office/drawing/2010/main" xmlns="" w="9525">
                   <a:solidFill>
                     <a:srgbClr val="000000"/>
                   </a:solidFill>
@@ -3975,7 +3975,7 @@
             </a:ln>
             <a:extLst>
               <a:ext uri="{91240B29-F687-4f45-9708-019B960494DF}">
-                <a14:hiddenLine xmlns="" xmlns:a14="http://schemas.microsoft.com/office/drawing/2010/main" w="9525">
+                <a14:hiddenLine xmlns:a14="http://schemas.microsoft.com/office/drawing/2010/main" xmlns="" w="9525">
                   <a:solidFill>
                     <a:srgbClr val="000000"/>
                   </a:solidFill>
@@ -4095,7 +4095,7 @@
             </a:ln>
             <a:extLst>
               <a:ext uri="{91240B29-F687-4f45-9708-019B960494DF}">
-                <a14:hiddenLine xmlns="" xmlns:a14="http://schemas.microsoft.com/office/drawing/2010/main" w="9525">
+                <a14:hiddenLine xmlns:a14="http://schemas.microsoft.com/office/drawing/2010/main" xmlns="" w="9525">
                   <a:solidFill>
                     <a:srgbClr val="000000"/>
                   </a:solidFill>
@@ -4163,7 +4163,7 @@
             </a:ln>
             <a:extLst>
               <a:ext uri="{91240B29-F687-4f45-9708-019B960494DF}">
-                <a14:hiddenLine xmlns="" xmlns:a14="http://schemas.microsoft.com/office/drawing/2010/main" w="9525">
+                <a14:hiddenLine xmlns:a14="http://schemas.microsoft.com/office/drawing/2010/main" xmlns="" w="9525">
                   <a:solidFill>
                     <a:srgbClr val="000000"/>
                   </a:solidFill>
@@ -4253,7 +4253,7 @@
             </a:ln>
             <a:extLst>
               <a:ext uri="{91240B29-F687-4f45-9708-019B960494DF}">
-                <a14:hiddenLine xmlns="" xmlns:a14="http://schemas.microsoft.com/office/drawing/2010/main" w="9525">
+                <a14:hiddenLine xmlns:a14="http://schemas.microsoft.com/office/drawing/2010/main" xmlns="" w="9525">
                   <a:solidFill>
                     <a:srgbClr val="000000"/>
                   </a:solidFill>
@@ -8975,7 +8975,7 @@
           <a:noFill/>
           <a:extLst>
             <a:ext uri="{909E8E84-426E-40dd-AFC4-6F175D3DCCD1}">
-              <a14:hiddenFill xmlns="" xmlns:a14="http://schemas.microsoft.com/office/drawing/2010/main">
+              <a14:hiddenFill xmlns:a14="http://schemas.microsoft.com/office/drawing/2010/main" xmlns="">
                 <a:solidFill>
                   <a:srgbClr val="FFFFFF"/>
                 </a:solidFill>
@@ -9049,7 +9049,7 @@
               </a:ln>
               <a:extLst>
                 <a:ext uri="{91240B29-F687-4f45-9708-019B960494DF}">
-                  <a14:hiddenLine xmlns="" xmlns:a14="http://schemas.microsoft.com/office/drawing/2010/main" w="9525">
+                  <a14:hiddenLine xmlns:a14="http://schemas.microsoft.com/office/drawing/2010/main" xmlns="" w="9525">
                     <a:solidFill>
                       <a:srgbClr val="000000"/>
                     </a:solidFill>
@@ -9139,7 +9139,7 @@
               </a:ln>
               <a:extLst>
                 <a:ext uri="{91240B29-F687-4f45-9708-019B960494DF}">
-                  <a14:hiddenLine xmlns="" xmlns:a14="http://schemas.microsoft.com/office/drawing/2010/main" w="9525">
+                  <a14:hiddenLine xmlns:a14="http://schemas.microsoft.com/office/drawing/2010/main" xmlns="" w="9525">
                     <a:solidFill>
                       <a:srgbClr val="000000"/>
                     </a:solidFill>
@@ -9229,7 +9229,7 @@
               </a:ln>
               <a:extLst>
                 <a:ext uri="{91240B29-F687-4f45-9708-019B960494DF}">
-                  <a14:hiddenLine xmlns="" xmlns:a14="http://schemas.microsoft.com/office/drawing/2010/main" w="9525">
+                  <a14:hiddenLine xmlns:a14="http://schemas.microsoft.com/office/drawing/2010/main" xmlns="" w="9525">
                     <a:solidFill>
                       <a:srgbClr val="000000"/>
                     </a:solidFill>
@@ -9291,7 +9291,7 @@
               </a:ln>
               <a:extLst>
                 <a:ext uri="{91240B29-F687-4f45-9708-019B960494DF}">
-                  <a14:hiddenLine xmlns="" xmlns:a14="http://schemas.microsoft.com/office/drawing/2010/main" w="9525">
+                  <a14:hiddenLine xmlns:a14="http://schemas.microsoft.com/office/drawing/2010/main" xmlns="" w="9525">
                     <a:solidFill>
                       <a:srgbClr val="000000"/>
                     </a:solidFill>
@@ -9381,7 +9381,7 @@
               </a:ln>
               <a:extLst>
                 <a:ext uri="{91240B29-F687-4f45-9708-019B960494DF}">
-                  <a14:hiddenLine xmlns="" xmlns:a14="http://schemas.microsoft.com/office/drawing/2010/main" w="9525">
+                  <a14:hiddenLine xmlns:a14="http://schemas.microsoft.com/office/drawing/2010/main" xmlns="" w="9525">
                     <a:solidFill>
                       <a:srgbClr val="000000"/>
                     </a:solidFill>
@@ -9443,7 +9443,7 @@
               </a:ln>
               <a:extLst>
                 <a:ext uri="{91240B29-F687-4f45-9708-019B960494DF}">
-                  <a14:hiddenLine xmlns="" xmlns:a14="http://schemas.microsoft.com/office/drawing/2010/main" w="9525">
+                  <a14:hiddenLine xmlns:a14="http://schemas.microsoft.com/office/drawing/2010/main" xmlns="" w="9525">
                     <a:solidFill>
                       <a:srgbClr val="000000"/>
                     </a:solidFill>
@@ -9505,7 +9505,7 @@
               </a:ln>
               <a:extLst>
                 <a:ext uri="{91240B29-F687-4f45-9708-019B960494DF}">
-                  <a14:hiddenLine xmlns="" xmlns:a14="http://schemas.microsoft.com/office/drawing/2010/main" w="9525">
+                  <a14:hiddenLine xmlns:a14="http://schemas.microsoft.com/office/drawing/2010/main" xmlns="" w="9525">
                     <a:solidFill>
                       <a:srgbClr val="000000"/>
                     </a:solidFill>
@@ -9595,7 +9595,7 @@
               </a:ln>
               <a:extLst>
                 <a:ext uri="{91240B29-F687-4f45-9708-019B960494DF}">
-                  <a14:hiddenLine xmlns="" xmlns:a14="http://schemas.microsoft.com/office/drawing/2010/main" w="9525">
+                  <a14:hiddenLine xmlns:a14="http://schemas.microsoft.com/office/drawing/2010/main" xmlns="" w="9525">
                     <a:solidFill>
                       <a:srgbClr val="000000"/>
                     </a:solidFill>
@@ -9685,7 +9685,7 @@
               </a:ln>
               <a:extLst>
                 <a:ext uri="{91240B29-F687-4f45-9708-019B960494DF}">
-                  <a14:hiddenLine xmlns="" xmlns:a14="http://schemas.microsoft.com/office/drawing/2010/main" w="9525">
+                  <a14:hiddenLine xmlns:a14="http://schemas.microsoft.com/office/drawing/2010/main" xmlns="" w="9525">
                     <a:solidFill>
                       <a:srgbClr val="000000"/>
                     </a:solidFill>
@@ -9747,7 +9747,7 @@
               </a:ln>
               <a:extLst>
                 <a:ext uri="{91240B29-F687-4f45-9708-019B960494DF}">
-                  <a14:hiddenLine xmlns="" xmlns:a14="http://schemas.microsoft.com/office/drawing/2010/main" w="9525">
+                  <a14:hiddenLine xmlns:a14="http://schemas.microsoft.com/office/drawing/2010/main" xmlns="" w="9525">
                     <a:solidFill>
                       <a:srgbClr val="000000"/>
                     </a:solidFill>
@@ -9857,7 +9857,7 @@
               </a:ln>
               <a:extLst>
                 <a:ext uri="{91240B29-F687-4f45-9708-019B960494DF}">
-                  <a14:hiddenLine xmlns="" xmlns:a14="http://schemas.microsoft.com/office/drawing/2010/main" w="9525">
+                  <a14:hiddenLine xmlns:a14="http://schemas.microsoft.com/office/drawing/2010/main" xmlns="" w="9525">
                     <a:solidFill>
                       <a:srgbClr val="000000"/>
                     </a:solidFill>
@@ -9941,7 +9941,7 @@
               </a:ln>
               <a:extLst>
                 <a:ext uri="{91240B29-F687-4f45-9708-019B960494DF}">
-                  <a14:hiddenLine xmlns="" xmlns:a14="http://schemas.microsoft.com/office/drawing/2010/main" w="9525">
+                  <a14:hiddenLine xmlns:a14="http://schemas.microsoft.com/office/drawing/2010/main" xmlns="" w="9525">
                     <a:solidFill>
                       <a:srgbClr val="000000"/>
                     </a:solidFill>
@@ -10003,7 +10003,7 @@
               </a:ln>
               <a:extLst>
                 <a:ext uri="{91240B29-F687-4f45-9708-019B960494DF}">
-                  <a14:hiddenLine xmlns="" xmlns:a14="http://schemas.microsoft.com/office/drawing/2010/main" w="9525">
+                  <a14:hiddenLine xmlns:a14="http://schemas.microsoft.com/office/drawing/2010/main" xmlns="" w="9525">
                     <a:solidFill>
                       <a:srgbClr val="000000"/>
                     </a:solidFill>
@@ -10065,7 +10065,7 @@
               </a:ln>
               <a:extLst>
                 <a:ext uri="{91240B29-F687-4f45-9708-019B960494DF}">
-                  <a14:hiddenLine xmlns="" xmlns:a14="http://schemas.microsoft.com/office/drawing/2010/main" w="9525">
+                  <a14:hiddenLine xmlns:a14="http://schemas.microsoft.com/office/drawing/2010/main" xmlns="" w="9525">
                     <a:solidFill>
                       <a:srgbClr val="000000"/>
                     </a:solidFill>
@@ -10155,7 +10155,7 @@
               </a:ln>
               <a:extLst>
                 <a:ext uri="{91240B29-F687-4f45-9708-019B960494DF}">
-                  <a14:hiddenLine xmlns="" xmlns:a14="http://schemas.microsoft.com/office/drawing/2010/main" w="9525">
+                  <a14:hiddenLine xmlns:a14="http://schemas.microsoft.com/office/drawing/2010/main" xmlns="" w="9525">
                     <a:solidFill>
                       <a:srgbClr val="000000"/>
                     </a:solidFill>
@@ -10189,7 +10189,7 @@
               </a:ln>
               <a:extLst>
                 <a:ext uri="{91240B29-F687-4f45-9708-019B960494DF}">
-                  <a14:hiddenLine xmlns="" xmlns:a14="http://schemas.microsoft.com/office/drawing/2010/main" w="9525">
+                  <a14:hiddenLine xmlns:a14="http://schemas.microsoft.com/office/drawing/2010/main" xmlns="" w="9525">
                     <a:solidFill>
                       <a:srgbClr val="000000"/>
                     </a:solidFill>
@@ -10254,7 +10254,7 @@
               </a:ln>
               <a:extLst>
                 <a:ext uri="{91240B29-F687-4f45-9708-019B960494DF}">
-                  <a14:hiddenLine xmlns="" xmlns:a14="http://schemas.microsoft.com/office/drawing/2010/main" w="9525">
+                  <a14:hiddenLine xmlns:a14="http://schemas.microsoft.com/office/drawing/2010/main" xmlns="" w="9525">
                     <a:solidFill>
                       <a:srgbClr val="000000"/>
                     </a:solidFill>
@@ -10344,7 +10344,7 @@
               </a:ln>
               <a:extLst>
                 <a:ext uri="{91240B29-F687-4f45-9708-019B960494DF}">
-                  <a14:hiddenLine xmlns="" xmlns:a14="http://schemas.microsoft.com/office/drawing/2010/main" w="9525">
+                  <a14:hiddenLine xmlns:a14="http://schemas.microsoft.com/office/drawing/2010/main" xmlns="" w="9525">
                     <a:solidFill>
                       <a:srgbClr val="000000"/>
                     </a:solidFill>
@@ -10406,7 +10406,7 @@
               </a:ln>
               <a:extLst>
                 <a:ext uri="{91240B29-F687-4f45-9708-019B960494DF}">
-                  <a14:hiddenLine xmlns="" xmlns:a14="http://schemas.microsoft.com/office/drawing/2010/main" w="9525">
+                  <a14:hiddenLine xmlns:a14="http://schemas.microsoft.com/office/drawing/2010/main" xmlns="" w="9525">
                     <a:solidFill>
                       <a:srgbClr val="000000"/>
                     </a:solidFill>
@@ -10496,7 +10496,7 @@
               </a:ln>
               <a:extLst>
                 <a:ext uri="{91240B29-F687-4f45-9708-019B960494DF}">
-                  <a14:hiddenLine xmlns="" xmlns:a14="http://schemas.microsoft.com/office/drawing/2010/main" w="9525">
+                  <a14:hiddenLine xmlns:a14="http://schemas.microsoft.com/office/drawing/2010/main" xmlns="" w="9525">
                     <a:solidFill>
                       <a:srgbClr val="000000"/>
                     </a:solidFill>
@@ -10561,7 +10561,7 @@
               </a:ln>
               <a:extLst>
                 <a:ext uri="{91240B29-F687-4f45-9708-019B960494DF}">
-                  <a14:hiddenLine xmlns="" xmlns:a14="http://schemas.microsoft.com/office/drawing/2010/main" w="9525">
+                  <a14:hiddenLine xmlns:a14="http://schemas.microsoft.com/office/drawing/2010/main" xmlns="" w="9525">
                     <a:solidFill>
                       <a:srgbClr val="000000"/>
                     </a:solidFill>
@@ -10623,7 +10623,7 @@
               </a:ln>
               <a:extLst>
                 <a:ext uri="{91240B29-F687-4f45-9708-019B960494DF}">
-                  <a14:hiddenLine xmlns="" xmlns:a14="http://schemas.microsoft.com/office/drawing/2010/main" w="9525">
+                  <a14:hiddenLine xmlns:a14="http://schemas.microsoft.com/office/drawing/2010/main" xmlns="" w="9525">
                     <a:solidFill>
                       <a:srgbClr val="000000"/>
                     </a:solidFill>
@@ -10713,7 +10713,7 @@
               </a:ln>
               <a:extLst>
                 <a:ext uri="{91240B29-F687-4f45-9708-019B960494DF}">
-                  <a14:hiddenLine xmlns="" xmlns:a14="http://schemas.microsoft.com/office/drawing/2010/main" w="9525">
+                  <a14:hiddenLine xmlns:a14="http://schemas.microsoft.com/office/drawing/2010/main" xmlns="" w="9525">
                     <a:solidFill>
                       <a:srgbClr val="000000"/>
                     </a:solidFill>
@@ -10803,7 +10803,7 @@
               </a:ln>
               <a:extLst>
                 <a:ext uri="{91240B29-F687-4f45-9708-019B960494DF}">
-                  <a14:hiddenLine xmlns="" xmlns:a14="http://schemas.microsoft.com/office/drawing/2010/main" w="9525">
+                  <a14:hiddenLine xmlns:a14="http://schemas.microsoft.com/office/drawing/2010/main" xmlns="" w="9525">
                     <a:solidFill>
                       <a:srgbClr val="000000"/>
                     </a:solidFill>
@@ -10868,7 +10868,7 @@
               </a:ln>
               <a:extLst>
                 <a:ext uri="{91240B29-F687-4f45-9708-019B960494DF}">
-                  <a14:hiddenLine xmlns="" xmlns:a14="http://schemas.microsoft.com/office/drawing/2010/main" w="9525">
+                  <a14:hiddenLine xmlns:a14="http://schemas.microsoft.com/office/drawing/2010/main" xmlns="" w="9525">
                     <a:solidFill>
                       <a:srgbClr val="000000"/>
                     </a:solidFill>
@@ -10988,7 +10988,7 @@
               </a:ln>
               <a:extLst>
                 <a:ext uri="{91240B29-F687-4f45-9708-019B960494DF}">
-                  <a14:hiddenLine xmlns="" xmlns:a14="http://schemas.microsoft.com/office/drawing/2010/main" w="9525">
+                  <a14:hiddenLine xmlns:a14="http://schemas.microsoft.com/office/drawing/2010/main" xmlns="" w="9525">
                     <a:solidFill>
                       <a:srgbClr val="000000"/>
                     </a:solidFill>
@@ -11086,7 +11086,7 @@
               </a:ln>
               <a:extLst>
                 <a:ext uri="{91240B29-F687-4f45-9708-019B960494DF}">
-                  <a14:hiddenLine xmlns="" xmlns:a14="http://schemas.microsoft.com/office/drawing/2010/main" w="9525">
+                  <a14:hiddenLine xmlns:a14="http://schemas.microsoft.com/office/drawing/2010/main" xmlns="" w="9525">
                     <a:solidFill>
                       <a:srgbClr val="000000"/>
                     </a:solidFill>
@@ -11201,7 +11201,7 @@
               </a:ln>
               <a:extLst>
                 <a:ext uri="{91240B29-F687-4f45-9708-019B960494DF}">
-                  <a14:hiddenLine xmlns="" xmlns:a14="http://schemas.microsoft.com/office/drawing/2010/main" w="9525">
+                  <a14:hiddenLine xmlns:a14="http://schemas.microsoft.com/office/drawing/2010/main" xmlns="" w="9525">
                     <a:solidFill>
                       <a:srgbClr val="000000"/>
                     </a:solidFill>
@@ -11291,7 +11291,7 @@
               </a:ln>
               <a:extLst>
                 <a:ext uri="{91240B29-F687-4f45-9708-019B960494DF}">
-                  <a14:hiddenLine xmlns="" xmlns:a14="http://schemas.microsoft.com/office/drawing/2010/main" w="9525">
+                  <a14:hiddenLine xmlns:a14="http://schemas.microsoft.com/office/drawing/2010/main" xmlns="" w="9525">
                     <a:solidFill>
                       <a:srgbClr val="000000"/>
                     </a:solidFill>
@@ -11356,7 +11356,7 @@
               </a:ln>
               <a:extLst>
                 <a:ext uri="{91240B29-F687-4f45-9708-019B960494DF}">
-                  <a14:hiddenLine xmlns="" xmlns:a14="http://schemas.microsoft.com/office/drawing/2010/main" w="9525">
+                  <a14:hiddenLine xmlns:a14="http://schemas.microsoft.com/office/drawing/2010/main" xmlns="" w="9525">
                     <a:solidFill>
                       <a:srgbClr val="000000"/>
                     </a:solidFill>
@@ -11446,7 +11446,7 @@
               </a:ln>
               <a:extLst>
                 <a:ext uri="{91240B29-F687-4f45-9708-019B960494DF}">
-                  <a14:hiddenLine xmlns="" xmlns:a14="http://schemas.microsoft.com/office/drawing/2010/main" w="9525">
+                  <a14:hiddenLine xmlns:a14="http://schemas.microsoft.com/office/drawing/2010/main" xmlns="" w="9525">
                     <a:solidFill>
                       <a:srgbClr val="000000"/>
                     </a:solidFill>
@@ -11514,7 +11514,7 @@
               </a:ln>
               <a:extLst>
                 <a:ext uri="{91240B29-F687-4f45-9708-019B960494DF}">
-                  <a14:hiddenLine xmlns="" xmlns:a14="http://schemas.microsoft.com/office/drawing/2010/main" w="9525">
+                  <a14:hiddenLine xmlns:a14="http://schemas.microsoft.com/office/drawing/2010/main" xmlns="" w="9525">
                     <a:solidFill>
                       <a:srgbClr val="000000"/>
                     </a:solidFill>
@@ -11604,7 +11604,7 @@
               </a:ln>
               <a:extLst>
                 <a:ext uri="{91240B29-F687-4f45-9708-019B960494DF}">
-                  <a14:hiddenLine xmlns="" xmlns:a14="http://schemas.microsoft.com/office/drawing/2010/main" w="9525">
+                  <a14:hiddenLine xmlns:a14="http://schemas.microsoft.com/office/drawing/2010/main" xmlns="" w="9525">
                     <a:solidFill>
                       <a:srgbClr val="000000"/>
                     </a:solidFill>
@@ -11672,7 +11672,7 @@
               </a:ln>
               <a:extLst>
                 <a:ext uri="{91240B29-F687-4f45-9708-019B960494DF}">
-                  <a14:hiddenLine xmlns="" xmlns:a14="http://schemas.microsoft.com/office/drawing/2010/main" w="9525">
+                  <a14:hiddenLine xmlns:a14="http://schemas.microsoft.com/office/drawing/2010/main" xmlns="" w="9525">
                     <a:solidFill>
                       <a:srgbClr val="000000"/>
                     </a:solidFill>
@@ -11762,7 +11762,7 @@
               </a:ln>
               <a:extLst>
                 <a:ext uri="{91240B29-F687-4f45-9708-019B960494DF}">
-                  <a14:hiddenLine xmlns="" xmlns:a14="http://schemas.microsoft.com/office/drawing/2010/main" w="9525">
+                  <a14:hiddenLine xmlns:a14="http://schemas.microsoft.com/office/drawing/2010/main" xmlns="" w="9525">
                     <a:solidFill>
                       <a:srgbClr val="000000"/>
                     </a:solidFill>
@@ -11796,7 +11796,7 @@
               </a:ln>
               <a:extLst>
                 <a:ext uri="{91240B29-F687-4f45-9708-019B960494DF}">
-                  <a14:hiddenLine xmlns="" xmlns:a14="http://schemas.microsoft.com/office/drawing/2010/main" w="9525">
+                  <a14:hiddenLine xmlns:a14="http://schemas.microsoft.com/office/drawing/2010/main" xmlns="" w="9525">
                     <a:solidFill>
                       <a:srgbClr val="000000"/>
                     </a:solidFill>
@@ -12636,6 +12636,14 @@
               <a:rPr lang="en-US" dirty="0" smtClean="0"/>
               <a:t>Google Calendar</a:t>
             </a:r>
+          </a:p>
+          <a:p>
+            <a:r>
+              <a:rPr lang="en-US" dirty="0"/>
+              <a:t>PS3 Eye camera video</a:t>
+            </a:r>
+          </a:p>
+          <a:p>
             <a:endParaRPr lang="en-US" dirty="0"/>
           </a:p>
         </p:txBody>
@@ -12714,7 +12722,7 @@
         </p:blipFill>
         <p:spPr bwMode="auto">
           <a:xfrm>
-            <a:off x="7313151" y="618518"/>
+            <a:off x="7865730" y="1144180"/>
             <a:ext cx="4953202" cy="4953202"/>
           </a:xfrm>
           <a:prstGeom prst="rect">
@@ -12794,8 +12802,8 @@
         </p:blipFill>
         <p:spPr bwMode="auto">
           <a:xfrm>
-            <a:off x="5155980" y="3095119"/>
-            <a:ext cx="3474632" cy="3474632"/>
+            <a:off x="5981486" y="0"/>
+            <a:ext cx="2446365" cy="2446365"/>
           </a:xfrm>
           <a:prstGeom prst="rect">
             <a:avLst/>
@@ -12835,8 +12843,49 @@
         </p:blipFill>
         <p:spPr bwMode="auto">
           <a:xfrm>
-            <a:off x="1546968" y="3763652"/>
-            <a:ext cx="2558597" cy="2558597"/>
+            <a:off x="1877475" y="4332454"/>
+            <a:ext cx="2189532" cy="2189532"/>
+          </a:xfrm>
+          <a:prstGeom prst="rect">
+            <a:avLst/>
+          </a:prstGeom>
+          <a:noFill/>
+          <a:extLst>
+            <a:ext uri="{909E8E84-426E-40DD-AFC4-6F175D3DCCD1}">
+              <a14:hiddenFill xmlns:a14="http://schemas.microsoft.com/office/drawing/2010/main">
+                <a:solidFill>
+                  <a:srgbClr val="FFFFFF"/>
+                </a:solidFill>
+              </a14:hiddenFill>
+            </a:ext>
+          </a:extLst>
+        </p:spPr>
+      </p:pic>
+      <p:pic>
+        <p:nvPicPr>
+          <p:cNvPr id="8" name="Picture 4" descr="Image result for PS3 eye"/>
+          <p:cNvPicPr>
+            <a:picLocks noChangeAspect="1" noChangeArrowheads="1"/>
+          </p:cNvPicPr>
+          <p:nvPr/>
+        </p:nvPicPr>
+        <p:blipFill>
+          <a:blip r:embed="rId6">
+            <a:extLst>
+              <a:ext uri="{28A0092B-C50C-407E-A947-70E740481C1C}">
+                <a14:useLocalDpi xmlns:a14="http://schemas.microsoft.com/office/drawing/2010/main" val="0"/>
+              </a:ext>
+            </a:extLst>
+          </a:blip>
+          <a:srcRect/>
+          <a:stretch>
+            <a:fillRect/>
+          </a:stretch>
+        </p:blipFill>
+        <p:spPr bwMode="auto">
+          <a:xfrm>
+            <a:off x="5420059" y="3423903"/>
+            <a:ext cx="3569220" cy="3098083"/>
           </a:xfrm>
           <a:prstGeom prst="rect">
             <a:avLst/>
@@ -12929,13 +12978,11 @@
           <a:p>
             <a:r>
               <a:rPr lang="en-US" dirty="0" smtClean="0"/>
-              <a:t>PS3 Eye camera video</a:t>
-            </a:r>
-          </a:p>
-          <a:p>
+              <a:t>Web </a:t>
+            </a:r>
             <a:r>
               <a:rPr lang="en-US" dirty="0" smtClean="0"/>
-              <a:t>Web user interface</a:t>
+              <a:t>user interface</a:t>
             </a:r>
           </a:p>
           <a:p>
@@ -12969,49 +13016,8 @@
         </p:blipFill>
         <p:spPr bwMode="auto">
           <a:xfrm>
-            <a:off x="4309801" y="3431330"/>
-            <a:ext cx="3245161" cy="3115137"/>
-          </a:xfrm>
-          <a:prstGeom prst="rect">
-            <a:avLst/>
-          </a:prstGeom>
-          <a:noFill/>
-          <a:extLst>
-            <a:ext uri="{909E8E84-426E-40DD-AFC4-6F175D3DCCD1}">
-              <a14:hiddenFill xmlns:a14="http://schemas.microsoft.com/office/drawing/2010/main">
-                <a:solidFill>
-                  <a:srgbClr val="FFFFFF"/>
-                </a:solidFill>
-              </a14:hiddenFill>
-            </a:ext>
-          </a:extLst>
-        </p:spPr>
-      </p:pic>
-      <p:pic>
-        <p:nvPicPr>
-          <p:cNvPr id="2052" name="Picture 4" descr="Image result for PS3 eye"/>
-          <p:cNvPicPr>
-            <a:picLocks noChangeAspect="1" noChangeArrowheads="1"/>
-          </p:cNvPicPr>
-          <p:nvPr/>
-        </p:nvPicPr>
-        <p:blipFill>
-          <a:blip r:embed="rId3">
-            <a:extLst>
-              <a:ext uri="{28A0092B-C50C-407E-A947-70E740481C1C}">
-                <a14:useLocalDpi xmlns:a14="http://schemas.microsoft.com/office/drawing/2010/main" val="0"/>
-              </a:ext>
-            </a:extLst>
-          </a:blip>
-          <a:srcRect/>
-          <a:stretch>
-            <a:fillRect/>
-          </a:stretch>
-        </p:blipFill>
-        <p:spPr bwMode="auto">
-          <a:xfrm>
-            <a:off x="4309801" y="548046"/>
-            <a:ext cx="3569220" cy="3098083"/>
+            <a:off x="3723702" y="1979254"/>
+            <a:ext cx="3897362" cy="3741206"/>
           </a:xfrm>
           <a:prstGeom prst="rect">
             <a:avLst/>
@@ -13037,7 +13043,7 @@
           <p:nvPr/>
         </p:nvPicPr>
         <p:blipFill>
-          <a:blip r:embed="rId4"/>
+          <a:blip r:embed="rId3"/>
           <a:stretch>
             <a:fillRect/>
           </a:stretch>
@@ -13270,11 +13276,7 @@
             </a:pPr>
             <a:r>
               <a:rPr lang="en-US" dirty="0" smtClean="0"/>
-              <a:t>View </a:t>
-            </a:r>
-            <a:r>
-              <a:rPr lang="en-US" dirty="0" smtClean="0"/>
-              <a:t>MMS</a:t>
+              <a:t>View MMS</a:t>
             </a:r>
           </a:p>
           <a:p>
@@ -13286,7 +13288,6 @@
               <a:rPr lang="en-US" dirty="0" smtClean="0"/>
               <a:t>View live stream</a:t>
             </a:r>
-            <a:endParaRPr lang="en-US" dirty="0" smtClean="0"/>
           </a:p>
           <a:p>
             <a:pPr marL="457200" indent="-457200">
@@ -13305,13 +13306,8 @@
             </a:pPr>
             <a:r>
               <a:rPr lang="en-US" dirty="0" smtClean="0"/>
-              <a:t>View UI to show status and test arming &amp; </a:t>
-            </a:r>
-            <a:r>
-              <a:rPr lang="en-US" dirty="0" smtClean="0"/>
-              <a:t>disarming</a:t>
-            </a:r>
-            <a:endParaRPr lang="en-US" dirty="0" smtClean="0"/>
+              <a:t>View UI to show status and test arming &amp; disarming</a:t>
+            </a:r>
           </a:p>
           <a:p>
             <a:pPr marL="457200" indent="-457200">
@@ -13320,11 +13316,7 @@
             </a:pPr>
             <a:r>
               <a:rPr lang="en-US" dirty="0" smtClean="0"/>
-              <a:t>View Watson </a:t>
-            </a:r>
-            <a:r>
-              <a:rPr lang="en-US" dirty="0" smtClean="0"/>
-              <a:t>graphs</a:t>
+              <a:t>View Watson graphs</a:t>
             </a:r>
           </a:p>
           <a:p>

</xml_diff>